<commit_message>
add first version second homework
</commit_message>
<xml_diff>
--- a/Lectures/Lecture 4. Exceptions.pptx
+++ b/Lectures/Lecture 4. Exceptions.pptx
@@ -260,7 +260,7 @@
   </p:defaultTextStyle>
   <p:extLst>
     <p:ext uri="{EFAFB233-063F-42B5-8137-9DF3F51BA10A}">
-      <p15:sldGuideLst xmlns:p15="http://schemas.microsoft.com/office/powerpoint/2012/main" xmlns=""/>
+      <p15:sldGuideLst xmlns:p15="http://schemas.microsoft.com/office/powerpoint/2012/main"/>
     </p:ext>
   </p:extLst>
 </p:presentation>
@@ -910,7 +910,7 @@
     </p:spTree>
     <p:extLst>
       <p:ext uri="{BB962C8B-B14F-4D97-AF65-F5344CB8AC3E}">
-        <p14:creationId xmlns:p14="http://schemas.microsoft.com/office/powerpoint/2010/main" xmlns="" val="3568550420"/>
+        <p14:creationId xmlns:p14="http://schemas.microsoft.com/office/powerpoint/2010/main" val="3568550420"/>
       </p:ext>
     </p:extLst>
   </p:cSld>
@@ -1019,7 +1019,7 @@
     </p:spTree>
     <p:extLst>
       <p:ext uri="{BB962C8B-B14F-4D97-AF65-F5344CB8AC3E}">
-        <p14:creationId xmlns:p14="http://schemas.microsoft.com/office/powerpoint/2010/main" xmlns="" val="775336362"/>
+        <p14:creationId xmlns:p14="http://schemas.microsoft.com/office/powerpoint/2010/main" val="775336362"/>
       </p:ext>
     </p:extLst>
   </p:cSld>
@@ -1128,7 +1128,7 @@
     </p:spTree>
     <p:extLst>
       <p:ext uri="{BB962C8B-B14F-4D97-AF65-F5344CB8AC3E}">
-        <p14:creationId xmlns:p14="http://schemas.microsoft.com/office/powerpoint/2010/main" xmlns="" val="3840145637"/>
+        <p14:creationId xmlns:p14="http://schemas.microsoft.com/office/powerpoint/2010/main" val="3840145637"/>
       </p:ext>
     </p:extLst>
   </p:cSld>
@@ -1237,7 +1237,7 @@
     </p:spTree>
     <p:extLst>
       <p:ext uri="{BB962C8B-B14F-4D97-AF65-F5344CB8AC3E}">
-        <p14:creationId xmlns:p14="http://schemas.microsoft.com/office/powerpoint/2010/main" xmlns="" val="858090466"/>
+        <p14:creationId xmlns:p14="http://schemas.microsoft.com/office/powerpoint/2010/main" val="858090466"/>
       </p:ext>
     </p:extLst>
   </p:cSld>
@@ -1346,7 +1346,7 @@
     </p:spTree>
     <p:extLst>
       <p:ext uri="{BB962C8B-B14F-4D97-AF65-F5344CB8AC3E}">
-        <p14:creationId xmlns:p14="http://schemas.microsoft.com/office/powerpoint/2010/main" xmlns="" val="157006831"/>
+        <p14:creationId xmlns:p14="http://schemas.microsoft.com/office/powerpoint/2010/main" val="157006831"/>
       </p:ext>
     </p:extLst>
   </p:cSld>
@@ -1455,7 +1455,7 @@
     </p:spTree>
     <p:extLst>
       <p:ext uri="{BB962C8B-B14F-4D97-AF65-F5344CB8AC3E}">
-        <p14:creationId xmlns:p14="http://schemas.microsoft.com/office/powerpoint/2010/main" xmlns="" val="348272008"/>
+        <p14:creationId xmlns:p14="http://schemas.microsoft.com/office/powerpoint/2010/main" val="348272008"/>
       </p:ext>
     </p:extLst>
   </p:cSld>
@@ -1564,7 +1564,7 @@
     </p:spTree>
     <p:extLst>
       <p:ext uri="{BB962C8B-B14F-4D97-AF65-F5344CB8AC3E}">
-        <p14:creationId xmlns:p14="http://schemas.microsoft.com/office/powerpoint/2010/main" xmlns="" val="1388490409"/>
+        <p14:creationId xmlns:p14="http://schemas.microsoft.com/office/powerpoint/2010/main" val="1388490409"/>
       </p:ext>
     </p:extLst>
   </p:cSld>
@@ -1673,7 +1673,7 @@
     </p:spTree>
     <p:extLst>
       <p:ext uri="{BB962C8B-B14F-4D97-AF65-F5344CB8AC3E}">
-        <p14:creationId xmlns:p14="http://schemas.microsoft.com/office/powerpoint/2010/main" xmlns="" val="1848079303"/>
+        <p14:creationId xmlns:p14="http://schemas.microsoft.com/office/powerpoint/2010/main" val="1848079303"/>
       </p:ext>
     </p:extLst>
   </p:cSld>
@@ -1782,7 +1782,7 @@
     </p:spTree>
     <p:extLst>
       <p:ext uri="{BB962C8B-B14F-4D97-AF65-F5344CB8AC3E}">
-        <p14:creationId xmlns:p14="http://schemas.microsoft.com/office/powerpoint/2010/main" xmlns="" val="2615352712"/>
+        <p14:creationId xmlns:p14="http://schemas.microsoft.com/office/powerpoint/2010/main" val="2615352712"/>
       </p:ext>
     </p:extLst>
   </p:cSld>
@@ -1891,7 +1891,7 @@
     </p:spTree>
     <p:extLst>
       <p:ext uri="{BB962C8B-B14F-4D97-AF65-F5344CB8AC3E}">
-        <p14:creationId xmlns:p14="http://schemas.microsoft.com/office/powerpoint/2010/main" xmlns="" val="3073709156"/>
+        <p14:creationId xmlns:p14="http://schemas.microsoft.com/office/powerpoint/2010/main" val="3073709156"/>
       </p:ext>
     </p:extLst>
   </p:cSld>
@@ -2000,7 +2000,7 @@
     </p:spTree>
     <p:extLst>
       <p:ext uri="{BB962C8B-B14F-4D97-AF65-F5344CB8AC3E}">
-        <p14:creationId xmlns:p14="http://schemas.microsoft.com/office/powerpoint/2010/main" xmlns="" val="2647696345"/>
+        <p14:creationId xmlns:p14="http://schemas.microsoft.com/office/powerpoint/2010/main" val="2647696345"/>
       </p:ext>
     </p:extLst>
   </p:cSld>
@@ -2109,7 +2109,7 @@
     </p:spTree>
     <p:extLst>
       <p:ext uri="{BB962C8B-B14F-4D97-AF65-F5344CB8AC3E}">
-        <p14:creationId xmlns:p14="http://schemas.microsoft.com/office/powerpoint/2010/main" xmlns="" val="2897147598"/>
+        <p14:creationId xmlns:p14="http://schemas.microsoft.com/office/powerpoint/2010/main" val="2897147598"/>
       </p:ext>
     </p:extLst>
   </p:cSld>
@@ -2218,7 +2218,7 @@
     </p:spTree>
     <p:extLst>
       <p:ext uri="{BB962C8B-B14F-4D97-AF65-F5344CB8AC3E}">
-        <p14:creationId xmlns:p14="http://schemas.microsoft.com/office/powerpoint/2010/main" xmlns="" val="2209231804"/>
+        <p14:creationId xmlns:p14="http://schemas.microsoft.com/office/powerpoint/2010/main" val="2209231804"/>
       </p:ext>
     </p:extLst>
   </p:cSld>
@@ -2327,7 +2327,7 @@
     </p:spTree>
     <p:extLst>
       <p:ext uri="{BB962C8B-B14F-4D97-AF65-F5344CB8AC3E}">
-        <p14:creationId xmlns:p14="http://schemas.microsoft.com/office/powerpoint/2010/main" xmlns="" val="806916289"/>
+        <p14:creationId xmlns:p14="http://schemas.microsoft.com/office/powerpoint/2010/main" val="806916289"/>
       </p:ext>
     </p:extLst>
   </p:cSld>
@@ -2436,7 +2436,7 @@
     </p:spTree>
     <p:extLst>
       <p:ext uri="{BB962C8B-B14F-4D97-AF65-F5344CB8AC3E}">
-        <p14:creationId xmlns:p14="http://schemas.microsoft.com/office/powerpoint/2010/main" xmlns="" val="2432731163"/>
+        <p14:creationId xmlns:p14="http://schemas.microsoft.com/office/powerpoint/2010/main" val="2432731163"/>
       </p:ext>
     </p:extLst>
   </p:cSld>
@@ -2545,7 +2545,7 @@
     </p:spTree>
     <p:extLst>
       <p:ext uri="{BB962C8B-B14F-4D97-AF65-F5344CB8AC3E}">
-        <p14:creationId xmlns:p14="http://schemas.microsoft.com/office/powerpoint/2010/main" xmlns="" val="591864549"/>
+        <p14:creationId xmlns:p14="http://schemas.microsoft.com/office/powerpoint/2010/main" val="591864549"/>
       </p:ext>
     </p:extLst>
   </p:cSld>
@@ -2654,7 +2654,7 @@
     </p:spTree>
     <p:extLst>
       <p:ext uri="{BB962C8B-B14F-4D97-AF65-F5344CB8AC3E}">
-        <p14:creationId xmlns:p14="http://schemas.microsoft.com/office/powerpoint/2010/main" xmlns="" val="3924101639"/>
+        <p14:creationId xmlns:p14="http://schemas.microsoft.com/office/powerpoint/2010/main" val="3924101639"/>
       </p:ext>
     </p:extLst>
   </p:cSld>
@@ -2910,15 +2910,6 @@
             </a:pPr>
             <a:fld id="{00000000-1234-1234-1234-123412341234}" type="slidenum">
               <a:rPr lang="ru"/>
-              <a:pPr marL="0" lvl="0" indent="0" algn="r" rtl="0">
-                <a:spcBef>
-                  <a:spcPts val="0"/>
-                </a:spcBef>
-                <a:spcAft>
-                  <a:spcPts val="0"/>
-                </a:spcAft>
-                <a:buNone/>
-              </a:pPr>
               <a:t>‹#›</a:t>
             </a:fld>
             <a:endParaRPr/>
@@ -2930,7 +2921,7 @@
           <p:cNvPr id="2" name="Нижний колонтитул 1">
             <a:extLst>
               <a:ext uri="{FF2B5EF4-FFF2-40B4-BE49-F238E27FC236}">
-                <a16:creationId xmlns:a16="http://schemas.microsoft.com/office/drawing/2014/main" xmlns="" id="{FB5BEE0F-CB97-4389-97DE-4C36EB8B25DE}"/>
+                <a16:creationId xmlns:a16="http://schemas.microsoft.com/office/drawing/2014/main" id="{FB5BEE0F-CB97-4389-97DE-4C36EB8B25DE}"/>
               </a:ext>
             </a:extLst>
           </p:cNvPr>
@@ -2960,7 +2951,7 @@
           <p:cNvPr id="4" name="Заголовок 3">
             <a:extLst>
               <a:ext uri="{FF2B5EF4-FFF2-40B4-BE49-F238E27FC236}">
-                <a16:creationId xmlns:a16="http://schemas.microsoft.com/office/drawing/2014/main" xmlns="" id="{A4420DBB-2072-4F41-ADC9-F378E7FC50B7}"/>
+                <a16:creationId xmlns:a16="http://schemas.microsoft.com/office/drawing/2014/main" id="{A4420DBB-2072-4F41-ADC9-F378E7FC50B7}"/>
               </a:ext>
             </a:extLst>
           </p:cNvPr>
@@ -3341,15 +3332,6 @@
             </a:pPr>
             <a:fld id="{00000000-1234-1234-1234-123412341234}" type="slidenum">
               <a:rPr lang="ru"/>
-              <a:pPr marL="0" lvl="0" indent="0" algn="r" rtl="0">
-                <a:spcBef>
-                  <a:spcPts val="0"/>
-                </a:spcBef>
-                <a:spcAft>
-                  <a:spcPts val="0"/>
-                </a:spcAft>
-                <a:buNone/>
-              </a:pPr>
               <a:t>‹#›</a:t>
             </a:fld>
             <a:endParaRPr/>
@@ -3454,15 +3436,6 @@
             </a:pPr>
             <a:fld id="{00000000-1234-1234-1234-123412341234}" type="slidenum">
               <a:rPr lang="ru"/>
-              <a:pPr marL="0" lvl="0" indent="0" algn="r" rtl="0">
-                <a:spcBef>
-                  <a:spcPts val="0"/>
-                </a:spcBef>
-                <a:spcAft>
-                  <a:spcPts val="0"/>
-                </a:spcAft>
-                <a:buNone/>
-              </a:pPr>
               <a:t>‹#›</a:t>
             </a:fld>
             <a:endParaRPr/>
@@ -3696,15 +3669,6 @@
             </a:pPr>
             <a:fld id="{00000000-1234-1234-1234-123412341234}" type="slidenum">
               <a:rPr lang="ru"/>
-              <a:pPr marL="0" lvl="0" indent="0" algn="r" rtl="0">
-                <a:spcBef>
-                  <a:spcPts val="0"/>
-                </a:spcBef>
-                <a:spcAft>
-                  <a:spcPts val="0"/>
-                </a:spcAft>
-                <a:buNone/>
-              </a:pPr>
               <a:t>‹#›</a:t>
             </a:fld>
             <a:endParaRPr/>
@@ -4074,7 +4038,7 @@
           <p:cNvPr id="2" name="Нижний колонтитул 1">
             <a:extLst>
               <a:ext uri="{FF2B5EF4-FFF2-40B4-BE49-F238E27FC236}">
-                <a16:creationId xmlns:a16="http://schemas.microsoft.com/office/drawing/2014/main" xmlns="" id="{921BA655-CEED-4C6A-BBB8-FFBD990C7848}"/>
+                <a16:creationId xmlns:a16="http://schemas.microsoft.com/office/drawing/2014/main" id="{921BA655-CEED-4C6A-BBB8-FFBD990C7848}"/>
               </a:ext>
             </a:extLst>
           </p:cNvPr>
@@ -4597,15 +4561,6 @@
             </a:pPr>
             <a:fld id="{00000000-1234-1234-1234-123412341234}" type="slidenum">
               <a:rPr lang="ru"/>
-              <a:pPr marL="0" lvl="0" indent="0" algn="r" rtl="0">
-                <a:spcBef>
-                  <a:spcPts val="0"/>
-                </a:spcBef>
-                <a:spcAft>
-                  <a:spcPts val="0"/>
-                </a:spcAft>
-                <a:buNone/>
-              </a:pPr>
               <a:t>‹#›</a:t>
             </a:fld>
             <a:endParaRPr/>
@@ -4839,15 +4794,6 @@
             </a:pPr>
             <a:fld id="{00000000-1234-1234-1234-123412341234}" type="slidenum">
               <a:rPr lang="ru"/>
-              <a:pPr marL="0" lvl="0" indent="0" algn="r" rtl="0">
-                <a:spcBef>
-                  <a:spcPts val="0"/>
-                </a:spcBef>
-                <a:spcAft>
-                  <a:spcPts val="0"/>
-                </a:spcAft>
-                <a:buNone/>
-              </a:pPr>
               <a:t>‹#›</a:t>
             </a:fld>
             <a:endParaRPr/>
@@ -5210,15 +5156,6 @@
             </a:pPr>
             <a:fld id="{00000000-1234-1234-1234-123412341234}" type="slidenum">
               <a:rPr lang="ru"/>
-              <a:pPr marL="0" lvl="0" indent="0" algn="r" rtl="0">
-                <a:spcBef>
-                  <a:spcPts val="0"/>
-                </a:spcBef>
-                <a:spcAft>
-                  <a:spcPts val="0"/>
-                </a:spcAft>
-                <a:buNone/>
-              </a:pPr>
               <a:t>‹#›</a:t>
             </a:fld>
             <a:endParaRPr/>
@@ -5452,15 +5389,6 @@
             </a:pPr>
             <a:fld id="{00000000-1234-1234-1234-123412341234}" type="slidenum">
               <a:rPr lang="ru"/>
-              <a:pPr marL="0" lvl="0" indent="0" algn="r" rtl="0">
-                <a:spcBef>
-                  <a:spcPts val="0"/>
-                </a:spcBef>
-                <a:spcAft>
-                  <a:spcPts val="0"/>
-                </a:spcAft>
-                <a:buNone/>
-              </a:pPr>
               <a:t>‹#›</a:t>
             </a:fld>
             <a:endParaRPr/>
@@ -6019,15 +5947,6 @@
             </a:pPr>
             <a:fld id="{00000000-1234-1234-1234-123412341234}" type="slidenum">
               <a:rPr lang="ru"/>
-              <a:pPr marL="0" lvl="0" indent="0" algn="r" rtl="0">
-                <a:spcBef>
-                  <a:spcPts val="0"/>
-                </a:spcBef>
-                <a:spcAft>
-                  <a:spcPts val="0"/>
-                </a:spcAft>
-                <a:buNone/>
-              </a:pPr>
               <a:t>‹#›</a:t>
             </a:fld>
             <a:endParaRPr/>
@@ -6176,15 +6095,6 @@
             </a:pPr>
             <a:fld id="{00000000-1234-1234-1234-123412341234}" type="slidenum">
               <a:rPr lang="ru"/>
-              <a:pPr marL="0" lvl="0" indent="0" algn="r" rtl="0">
-                <a:spcBef>
-                  <a:spcPts val="0"/>
-                </a:spcBef>
-                <a:spcAft>
-                  <a:spcPts val="0"/>
-                </a:spcAft>
-                <a:buNone/>
-              </a:pPr>
               <a:t>‹#›</a:t>
             </a:fld>
             <a:endParaRPr/>
@@ -6761,7 +6671,7 @@
           <p:cNvPr id="2" name="Нижний колонтитул 1">
             <a:extLst>
               <a:ext uri="{FF2B5EF4-FFF2-40B4-BE49-F238E27FC236}">
-                <a16:creationId xmlns:a16="http://schemas.microsoft.com/office/drawing/2014/main" xmlns="" id="{3C39451B-8733-47B9-A4F4-8A45D486DF5F}"/>
+                <a16:creationId xmlns:a16="http://schemas.microsoft.com/office/drawing/2014/main" id="{3C39451B-8733-47B9-A4F4-8A45D486DF5F}"/>
               </a:ext>
             </a:extLst>
           </p:cNvPr>
@@ -8001,7 +7911,7 @@
           <p:cNvPr id="2" name="Нижний колонтитул 1">
             <a:extLst>
               <a:ext uri="{FF2B5EF4-FFF2-40B4-BE49-F238E27FC236}">
-                <a16:creationId xmlns:a16="http://schemas.microsoft.com/office/drawing/2014/main" xmlns="" id="{B0B944AD-A064-41F9-A961-293AE0778F04}"/>
+                <a16:creationId xmlns:a16="http://schemas.microsoft.com/office/drawing/2014/main" id="{B0B944AD-A064-41F9-A961-293AE0778F04}"/>
               </a:ext>
             </a:extLst>
           </p:cNvPr>
@@ -8031,7 +7941,7 @@
           <p:cNvPr id="4" name="Номер слайда 3">
             <a:extLst>
               <a:ext uri="{FF2B5EF4-FFF2-40B4-BE49-F238E27FC236}">
-                <a16:creationId xmlns:a16="http://schemas.microsoft.com/office/drawing/2014/main" xmlns="" id="{B63A2C4E-C8D3-4FFB-A1CA-A776AEE3F9D4}"/>
+                <a16:creationId xmlns:a16="http://schemas.microsoft.com/office/drawing/2014/main" id="{B63A2C4E-C8D3-4FFB-A1CA-A776AEE3F9D4}"/>
               </a:ext>
             </a:extLst>
           </p:cNvPr>
@@ -8061,7 +7971,7 @@
           <p:cNvPr id="11" name="Google Shape;101;p17">
             <a:extLst>
               <a:ext uri="{FF2B5EF4-FFF2-40B4-BE49-F238E27FC236}">
-                <a16:creationId xmlns:a16="http://schemas.microsoft.com/office/drawing/2014/main" xmlns="" id="{3274333C-B02B-43BD-AD9D-2559753D386A}"/>
+                <a16:creationId xmlns:a16="http://schemas.microsoft.com/office/drawing/2014/main" id="{3274333C-B02B-43BD-AD9D-2559753D386A}"/>
               </a:ext>
             </a:extLst>
           </p:cNvPr>
@@ -8114,7 +8024,7 @@
           <p:cNvPr id="19" name="TextBox 18">
             <a:extLst>
               <a:ext uri="{FF2B5EF4-FFF2-40B4-BE49-F238E27FC236}">
-                <a16:creationId xmlns:a16="http://schemas.microsoft.com/office/drawing/2014/main" xmlns="" id="{A912B252-B8A3-460E-93BB-BF8748D6242A}"/>
+                <a16:creationId xmlns:a16="http://schemas.microsoft.com/office/drawing/2014/main" id="{A912B252-B8A3-460E-93BB-BF8748D6242A}"/>
               </a:ext>
             </a:extLst>
           </p:cNvPr>
@@ -8616,7 +8526,7 @@
           <p:cNvPr id="5" name="Rectangle 1">
             <a:extLst>
               <a:ext uri="{FF2B5EF4-FFF2-40B4-BE49-F238E27FC236}">
-                <a16:creationId xmlns:a16="http://schemas.microsoft.com/office/drawing/2014/main" xmlns="" id="{44C3A3B9-8F92-4B86-B470-B9E92EC6D1E2}"/>
+                <a16:creationId xmlns:a16="http://schemas.microsoft.com/office/drawing/2014/main" id="{44C3A3B9-8F92-4B86-B470-B9E92EC6D1E2}"/>
               </a:ext>
             </a:extLst>
           </p:cNvPr>
@@ -9858,7 +9768,7 @@
           <p:cNvPr id="20" name="TextBox 19">
             <a:extLst>
               <a:ext uri="{FF2B5EF4-FFF2-40B4-BE49-F238E27FC236}">
-                <a16:creationId xmlns:a16="http://schemas.microsoft.com/office/drawing/2014/main" xmlns="" id="{657F32DD-D52A-46BB-9BF0-66A9E9A97C99}"/>
+                <a16:creationId xmlns:a16="http://schemas.microsoft.com/office/drawing/2014/main" id="{657F32DD-D52A-46BB-9BF0-66A9E9A97C99}"/>
               </a:ext>
             </a:extLst>
           </p:cNvPr>
@@ -9965,7 +9875,7 @@
           <p:cNvPr id="21" name="Рисунок 21" descr="Значок &quot;Крестик&quot; со сплошной заливкой">
             <a:extLst>
               <a:ext uri="{FF2B5EF4-FFF2-40B4-BE49-F238E27FC236}">
-                <a16:creationId xmlns:a16="http://schemas.microsoft.com/office/drawing/2014/main" xmlns="" id="{DCB464D7-958E-4153-9AE7-54F7EE14CE47}"/>
+                <a16:creationId xmlns:a16="http://schemas.microsoft.com/office/drawing/2014/main" id="{DCB464D7-958E-4153-9AE7-54F7EE14CE47}"/>
               </a:ext>
             </a:extLst>
           </p:cNvPr>
@@ -9978,7 +9888,7 @@
           <a:blip r:embed="rId4">
             <a:extLst>
               <a:ext uri="{96DAC541-7B7A-43D3-8B79-37D633B846F1}">
-                <asvg:svgBlip xmlns:asvg="http://schemas.microsoft.com/office/drawing/2016/SVG/main" xmlns="" r:embed="rId5"/>
+                <asvg:svgBlip xmlns:asvg="http://schemas.microsoft.com/office/drawing/2016/SVG/main" r:embed="rId5"/>
               </a:ext>
             </a:extLst>
           </a:blip>
@@ -9999,7 +9909,7 @@
     </p:spTree>
     <p:extLst>
       <p:ext uri="{BB962C8B-B14F-4D97-AF65-F5344CB8AC3E}">
-        <p14:creationId xmlns:p14="http://schemas.microsoft.com/office/powerpoint/2010/main" xmlns="" val="865217308"/>
+        <p14:creationId xmlns:p14="http://schemas.microsoft.com/office/powerpoint/2010/main" val="865217308"/>
       </p:ext>
     </p:extLst>
   </p:cSld>
@@ -10165,7 +10075,7 @@
           <p:cNvPr id="2" name="Нижний колонтитул 1">
             <a:extLst>
               <a:ext uri="{FF2B5EF4-FFF2-40B4-BE49-F238E27FC236}">
-                <a16:creationId xmlns:a16="http://schemas.microsoft.com/office/drawing/2014/main" xmlns="" id="{B0B944AD-A064-41F9-A961-293AE0778F04}"/>
+                <a16:creationId xmlns:a16="http://schemas.microsoft.com/office/drawing/2014/main" id="{B0B944AD-A064-41F9-A961-293AE0778F04}"/>
               </a:ext>
             </a:extLst>
           </p:cNvPr>
@@ -10195,7 +10105,7 @@
           <p:cNvPr id="4" name="Номер слайда 3">
             <a:extLst>
               <a:ext uri="{FF2B5EF4-FFF2-40B4-BE49-F238E27FC236}">
-                <a16:creationId xmlns:a16="http://schemas.microsoft.com/office/drawing/2014/main" xmlns="" id="{B63A2C4E-C8D3-4FFB-A1CA-A776AEE3F9D4}"/>
+                <a16:creationId xmlns:a16="http://schemas.microsoft.com/office/drawing/2014/main" id="{B63A2C4E-C8D3-4FFB-A1CA-A776AEE3F9D4}"/>
               </a:ext>
             </a:extLst>
           </p:cNvPr>
@@ -10225,7 +10135,7 @@
           <p:cNvPr id="11" name="Google Shape;101;p17">
             <a:extLst>
               <a:ext uri="{FF2B5EF4-FFF2-40B4-BE49-F238E27FC236}">
-                <a16:creationId xmlns:a16="http://schemas.microsoft.com/office/drawing/2014/main" xmlns="" id="{3274333C-B02B-43BD-AD9D-2559753D386A}"/>
+                <a16:creationId xmlns:a16="http://schemas.microsoft.com/office/drawing/2014/main" id="{3274333C-B02B-43BD-AD9D-2559753D386A}"/>
               </a:ext>
             </a:extLst>
           </p:cNvPr>
@@ -10278,7 +10188,7 @@
           <p:cNvPr id="5" name="Rectangle 1">
             <a:extLst>
               <a:ext uri="{FF2B5EF4-FFF2-40B4-BE49-F238E27FC236}">
-                <a16:creationId xmlns:a16="http://schemas.microsoft.com/office/drawing/2014/main" xmlns="" id="{44C3A3B9-8F92-4B86-B470-B9E92EC6D1E2}"/>
+                <a16:creationId xmlns:a16="http://schemas.microsoft.com/office/drawing/2014/main" id="{44C3A3B9-8F92-4B86-B470-B9E92EC6D1E2}"/>
               </a:ext>
             </a:extLst>
           </p:cNvPr>
@@ -11531,7 +11441,7 @@
           <p:cNvPr id="20" name="TextBox 19">
             <a:extLst>
               <a:ext uri="{FF2B5EF4-FFF2-40B4-BE49-F238E27FC236}">
-                <a16:creationId xmlns:a16="http://schemas.microsoft.com/office/drawing/2014/main" xmlns="" id="{657F32DD-D52A-46BB-9BF0-66A9E9A97C99}"/>
+                <a16:creationId xmlns:a16="http://schemas.microsoft.com/office/drawing/2014/main" id="{657F32DD-D52A-46BB-9BF0-66A9E9A97C99}"/>
               </a:ext>
             </a:extLst>
           </p:cNvPr>
@@ -11576,7 +11486,7 @@
           <p:cNvPr id="12" name="Рисунок 4" descr="Значок &quot;Галочка1&quot; со сплошной заливкой">
             <a:extLst>
               <a:ext uri="{FF2B5EF4-FFF2-40B4-BE49-F238E27FC236}">
-                <a16:creationId xmlns:a16="http://schemas.microsoft.com/office/drawing/2014/main" xmlns="" id="{5BF9F0E4-3C59-4EE1-B106-63E1C856D832}"/>
+                <a16:creationId xmlns:a16="http://schemas.microsoft.com/office/drawing/2014/main" id="{5BF9F0E4-3C59-4EE1-B106-63E1C856D832}"/>
               </a:ext>
             </a:extLst>
           </p:cNvPr>
@@ -11589,7 +11499,7 @@
           <a:blip r:embed="rId4">
             <a:extLst>
               <a:ext uri="{96DAC541-7B7A-43D3-8B79-37D633B846F1}">
-                <asvg:svgBlip xmlns:asvg="http://schemas.microsoft.com/office/drawing/2016/SVG/main" xmlns="" r:embed="rId5"/>
+                <asvg:svgBlip xmlns:asvg="http://schemas.microsoft.com/office/drawing/2016/SVG/main" r:embed="rId5"/>
               </a:ext>
             </a:extLst>
           </a:blip>
@@ -11612,7 +11522,7 @@
           <p:cNvPr id="13" name="TextBox 12">
             <a:extLst>
               <a:ext uri="{FF2B5EF4-FFF2-40B4-BE49-F238E27FC236}">
-                <a16:creationId xmlns:a16="http://schemas.microsoft.com/office/drawing/2014/main" xmlns="" id="{4113A3C4-452D-491B-A756-98E58656D304}"/>
+                <a16:creationId xmlns:a16="http://schemas.microsoft.com/office/drawing/2014/main" id="{4113A3C4-452D-491B-A756-98E58656D304}"/>
               </a:ext>
             </a:extLst>
           </p:cNvPr>
@@ -11666,7 +11576,7 @@
     </p:spTree>
     <p:extLst>
       <p:ext uri="{BB962C8B-B14F-4D97-AF65-F5344CB8AC3E}">
-        <p14:creationId xmlns:p14="http://schemas.microsoft.com/office/powerpoint/2010/main" xmlns="" val="4022536668"/>
+        <p14:creationId xmlns:p14="http://schemas.microsoft.com/office/powerpoint/2010/main" val="4022536668"/>
       </p:ext>
     </p:extLst>
   </p:cSld>
@@ -11832,7 +11742,7 @@
           <p:cNvPr id="2" name="Нижний колонтитул 1">
             <a:extLst>
               <a:ext uri="{FF2B5EF4-FFF2-40B4-BE49-F238E27FC236}">
-                <a16:creationId xmlns:a16="http://schemas.microsoft.com/office/drawing/2014/main" xmlns="" id="{B0B944AD-A064-41F9-A961-293AE0778F04}"/>
+                <a16:creationId xmlns:a16="http://schemas.microsoft.com/office/drawing/2014/main" id="{B0B944AD-A064-41F9-A961-293AE0778F04}"/>
               </a:ext>
             </a:extLst>
           </p:cNvPr>
@@ -11862,7 +11772,7 @@
           <p:cNvPr id="4" name="Номер слайда 3">
             <a:extLst>
               <a:ext uri="{FF2B5EF4-FFF2-40B4-BE49-F238E27FC236}">
-                <a16:creationId xmlns:a16="http://schemas.microsoft.com/office/drawing/2014/main" xmlns="" id="{B63A2C4E-C8D3-4FFB-A1CA-A776AEE3F9D4}"/>
+                <a16:creationId xmlns:a16="http://schemas.microsoft.com/office/drawing/2014/main" id="{B63A2C4E-C8D3-4FFB-A1CA-A776AEE3F9D4}"/>
               </a:ext>
             </a:extLst>
           </p:cNvPr>
@@ -11892,7 +11802,7 @@
           <p:cNvPr id="11" name="Google Shape;101;p17">
             <a:extLst>
               <a:ext uri="{FF2B5EF4-FFF2-40B4-BE49-F238E27FC236}">
-                <a16:creationId xmlns:a16="http://schemas.microsoft.com/office/drawing/2014/main" xmlns="" id="{3274333C-B02B-43BD-AD9D-2559753D386A}"/>
+                <a16:creationId xmlns:a16="http://schemas.microsoft.com/office/drawing/2014/main" id="{3274333C-B02B-43BD-AD9D-2559753D386A}"/>
               </a:ext>
             </a:extLst>
           </p:cNvPr>
@@ -11945,7 +11855,7 @@
           <p:cNvPr id="13" name="TextBox 12">
             <a:extLst>
               <a:ext uri="{FF2B5EF4-FFF2-40B4-BE49-F238E27FC236}">
-                <a16:creationId xmlns:a16="http://schemas.microsoft.com/office/drawing/2014/main" xmlns="" id="{4113A3C4-452D-491B-A756-98E58656D304}"/>
+                <a16:creationId xmlns:a16="http://schemas.microsoft.com/office/drawing/2014/main" id="{4113A3C4-452D-491B-A756-98E58656D304}"/>
               </a:ext>
             </a:extLst>
           </p:cNvPr>
@@ -12052,7 +11962,7 @@
           <p:cNvPr id="14" name="TextBox 13">
             <a:extLst>
               <a:ext uri="{FF2B5EF4-FFF2-40B4-BE49-F238E27FC236}">
-                <a16:creationId xmlns:a16="http://schemas.microsoft.com/office/drawing/2014/main" xmlns="" id="{6BDF77FB-4CA2-4B22-ADC7-5C33E13CAE94}"/>
+                <a16:creationId xmlns:a16="http://schemas.microsoft.com/office/drawing/2014/main" id="{6BDF77FB-4CA2-4B22-ADC7-5C33E13CAE94}"/>
               </a:ext>
             </a:extLst>
           </p:cNvPr>
@@ -12095,7 +12005,7 @@
     </p:spTree>
     <p:extLst>
       <p:ext uri="{BB962C8B-B14F-4D97-AF65-F5344CB8AC3E}">
-        <p14:creationId xmlns:p14="http://schemas.microsoft.com/office/powerpoint/2010/main" xmlns="" val="849264998"/>
+        <p14:creationId xmlns:p14="http://schemas.microsoft.com/office/powerpoint/2010/main" val="849264998"/>
       </p:ext>
     </p:extLst>
   </p:cSld>
@@ -12261,7 +12171,7 @@
           <p:cNvPr id="2" name="Нижний колонтитул 1">
             <a:extLst>
               <a:ext uri="{FF2B5EF4-FFF2-40B4-BE49-F238E27FC236}">
-                <a16:creationId xmlns:a16="http://schemas.microsoft.com/office/drawing/2014/main" xmlns="" id="{B0B944AD-A064-41F9-A961-293AE0778F04}"/>
+                <a16:creationId xmlns:a16="http://schemas.microsoft.com/office/drawing/2014/main" id="{B0B944AD-A064-41F9-A961-293AE0778F04}"/>
               </a:ext>
             </a:extLst>
           </p:cNvPr>
@@ -12291,7 +12201,7 @@
           <p:cNvPr id="4" name="Номер слайда 3">
             <a:extLst>
               <a:ext uri="{FF2B5EF4-FFF2-40B4-BE49-F238E27FC236}">
-                <a16:creationId xmlns:a16="http://schemas.microsoft.com/office/drawing/2014/main" xmlns="" id="{B63A2C4E-C8D3-4FFB-A1CA-A776AEE3F9D4}"/>
+                <a16:creationId xmlns:a16="http://schemas.microsoft.com/office/drawing/2014/main" id="{B63A2C4E-C8D3-4FFB-A1CA-A776AEE3F9D4}"/>
               </a:ext>
             </a:extLst>
           </p:cNvPr>
@@ -12321,7 +12231,7 @@
           <p:cNvPr id="11" name="Google Shape;101;p17">
             <a:extLst>
               <a:ext uri="{FF2B5EF4-FFF2-40B4-BE49-F238E27FC236}">
-                <a16:creationId xmlns:a16="http://schemas.microsoft.com/office/drawing/2014/main" xmlns="" id="{3274333C-B02B-43BD-AD9D-2559753D386A}"/>
+                <a16:creationId xmlns:a16="http://schemas.microsoft.com/office/drawing/2014/main" id="{3274333C-B02B-43BD-AD9D-2559753D386A}"/>
               </a:ext>
             </a:extLst>
           </p:cNvPr>
@@ -12374,7 +12284,7 @@
           <p:cNvPr id="3" name="Rectangle 1">
             <a:extLst>
               <a:ext uri="{FF2B5EF4-FFF2-40B4-BE49-F238E27FC236}">
-                <a16:creationId xmlns:a16="http://schemas.microsoft.com/office/drawing/2014/main" xmlns="" id="{FBD639E8-A61B-405E-BC0C-AACA8A5F325E}"/>
+                <a16:creationId xmlns:a16="http://schemas.microsoft.com/office/drawing/2014/main" id="{FBD639E8-A61B-405E-BC0C-AACA8A5F325E}"/>
               </a:ext>
             </a:extLst>
           </p:cNvPr>
@@ -14075,7 +13985,7 @@
           <p:cNvPr id="12" name="Picture 5">
             <a:extLst>
               <a:ext uri="{FF2B5EF4-FFF2-40B4-BE49-F238E27FC236}">
-                <a16:creationId xmlns:a16="http://schemas.microsoft.com/office/drawing/2014/main" xmlns="" id="{F50C1642-EF5C-4910-8C96-3BDFB0EFA68C}"/>
+                <a16:creationId xmlns:a16="http://schemas.microsoft.com/office/drawing/2014/main" id="{F50C1642-EF5C-4910-8C96-3BDFB0EFA68C}"/>
               </a:ext>
             </a:extLst>
           </p:cNvPr>
@@ -14088,7 +13998,7 @@
           <a:blip r:embed="rId4">
             <a:extLst>
               <a:ext uri="{28A0092B-C50C-407E-A947-70E740481C1C}">
-                <a14:useLocalDpi xmlns:a14="http://schemas.microsoft.com/office/drawing/2010/main" xmlns="" val="0"/>
+                <a14:useLocalDpi xmlns:a14="http://schemas.microsoft.com/office/drawing/2010/main" val="0"/>
               </a:ext>
             </a:extLst>
           </a:blip>
@@ -14111,14 +14021,14 @@
           </a:ln>
           <a:extLst>
             <a:ext uri="{909E8E84-426E-40DD-AFC4-6F175D3DCCD1}">
-              <a14:hiddenFill xmlns:a14="http://schemas.microsoft.com/office/drawing/2010/main" xmlns="">
+              <a14:hiddenFill xmlns:a14="http://schemas.microsoft.com/office/drawing/2010/main">
                 <a:solidFill>
                   <a:srgbClr val="FFFFFF"/>
                 </a:solidFill>
               </a14:hiddenFill>
             </a:ext>
             <a:ext uri="{91240B29-F687-4F45-9708-019B960494DF}">
-              <a14:hiddenLine xmlns:a14="http://schemas.microsoft.com/office/drawing/2010/main" xmlns="" w="9525">
+              <a14:hiddenLine xmlns:a14="http://schemas.microsoft.com/office/drawing/2010/main" w="9525">
                 <a:solidFill>
                   <a:srgbClr val="000000"/>
                 </a:solidFill>
@@ -14133,7 +14043,7 @@
     </p:spTree>
     <p:extLst>
       <p:ext uri="{BB962C8B-B14F-4D97-AF65-F5344CB8AC3E}">
-        <p14:creationId xmlns:p14="http://schemas.microsoft.com/office/powerpoint/2010/main" xmlns="" val="2494351302"/>
+        <p14:creationId xmlns:p14="http://schemas.microsoft.com/office/powerpoint/2010/main" val="2494351302"/>
       </p:ext>
     </p:extLst>
   </p:cSld>
@@ -14307,7 +14217,7 @@
           <p:cNvPr id="2" name="Нижний колонтитул 1">
             <a:extLst>
               <a:ext uri="{FF2B5EF4-FFF2-40B4-BE49-F238E27FC236}">
-                <a16:creationId xmlns:a16="http://schemas.microsoft.com/office/drawing/2014/main" xmlns="" id="{B0B944AD-A064-41F9-A961-293AE0778F04}"/>
+                <a16:creationId xmlns:a16="http://schemas.microsoft.com/office/drawing/2014/main" id="{B0B944AD-A064-41F9-A961-293AE0778F04}"/>
               </a:ext>
             </a:extLst>
           </p:cNvPr>
@@ -14337,7 +14247,7 @@
           <p:cNvPr id="4" name="Номер слайда 3">
             <a:extLst>
               <a:ext uri="{FF2B5EF4-FFF2-40B4-BE49-F238E27FC236}">
-                <a16:creationId xmlns:a16="http://schemas.microsoft.com/office/drawing/2014/main" xmlns="" id="{B63A2C4E-C8D3-4FFB-A1CA-A776AEE3F9D4}"/>
+                <a16:creationId xmlns:a16="http://schemas.microsoft.com/office/drawing/2014/main" id="{B63A2C4E-C8D3-4FFB-A1CA-A776AEE3F9D4}"/>
               </a:ext>
             </a:extLst>
           </p:cNvPr>
@@ -14367,7 +14277,7 @@
           <p:cNvPr id="11" name="Google Shape;101;p17">
             <a:extLst>
               <a:ext uri="{FF2B5EF4-FFF2-40B4-BE49-F238E27FC236}">
-                <a16:creationId xmlns:a16="http://schemas.microsoft.com/office/drawing/2014/main" xmlns="" id="{3274333C-B02B-43BD-AD9D-2559753D386A}"/>
+                <a16:creationId xmlns:a16="http://schemas.microsoft.com/office/drawing/2014/main" id="{3274333C-B02B-43BD-AD9D-2559753D386A}"/>
               </a:ext>
             </a:extLst>
           </p:cNvPr>
@@ -14420,7 +14330,7 @@
           <p:cNvPr id="10" name="TextBox 9">
             <a:extLst>
               <a:ext uri="{FF2B5EF4-FFF2-40B4-BE49-F238E27FC236}">
-                <a16:creationId xmlns:a16="http://schemas.microsoft.com/office/drawing/2014/main" xmlns="" id="{DF6B32E4-1E51-4998-A772-7AA06FD63293}"/>
+                <a16:creationId xmlns:a16="http://schemas.microsoft.com/office/drawing/2014/main" id="{DF6B32E4-1E51-4998-A772-7AA06FD63293}"/>
               </a:ext>
             </a:extLst>
           </p:cNvPr>
@@ -14837,7 +14747,7 @@
     </p:spTree>
     <p:extLst>
       <p:ext uri="{BB962C8B-B14F-4D97-AF65-F5344CB8AC3E}">
-        <p14:creationId xmlns:p14="http://schemas.microsoft.com/office/powerpoint/2010/main" xmlns="" val="934782216"/>
+        <p14:creationId xmlns:p14="http://schemas.microsoft.com/office/powerpoint/2010/main" val="934782216"/>
       </p:ext>
     </p:extLst>
   </p:cSld>
@@ -15022,7 +14932,7 @@
           <p:cNvPr id="2" name="Нижний колонтитул 1">
             <a:extLst>
               <a:ext uri="{FF2B5EF4-FFF2-40B4-BE49-F238E27FC236}">
-                <a16:creationId xmlns:a16="http://schemas.microsoft.com/office/drawing/2014/main" xmlns="" id="{B0B944AD-A064-41F9-A961-293AE0778F04}"/>
+                <a16:creationId xmlns:a16="http://schemas.microsoft.com/office/drawing/2014/main" id="{B0B944AD-A064-41F9-A961-293AE0778F04}"/>
               </a:ext>
             </a:extLst>
           </p:cNvPr>
@@ -15052,7 +14962,7 @@
           <p:cNvPr id="4" name="Номер слайда 3">
             <a:extLst>
               <a:ext uri="{FF2B5EF4-FFF2-40B4-BE49-F238E27FC236}">
-                <a16:creationId xmlns:a16="http://schemas.microsoft.com/office/drawing/2014/main" xmlns="" id="{B63A2C4E-C8D3-4FFB-A1CA-A776AEE3F9D4}"/>
+                <a16:creationId xmlns:a16="http://schemas.microsoft.com/office/drawing/2014/main" id="{B63A2C4E-C8D3-4FFB-A1CA-A776AEE3F9D4}"/>
               </a:ext>
             </a:extLst>
           </p:cNvPr>
@@ -15082,7 +14992,7 @@
           <p:cNvPr id="11" name="Google Shape;101;p17">
             <a:extLst>
               <a:ext uri="{FF2B5EF4-FFF2-40B4-BE49-F238E27FC236}">
-                <a16:creationId xmlns:a16="http://schemas.microsoft.com/office/drawing/2014/main" xmlns="" id="{3274333C-B02B-43BD-AD9D-2559753D386A}"/>
+                <a16:creationId xmlns:a16="http://schemas.microsoft.com/office/drawing/2014/main" id="{3274333C-B02B-43BD-AD9D-2559753D386A}"/>
               </a:ext>
             </a:extLst>
           </p:cNvPr>
@@ -15135,7 +15045,7 @@
           <p:cNvPr id="3" name="Rectangle 1">
             <a:extLst>
               <a:ext uri="{FF2B5EF4-FFF2-40B4-BE49-F238E27FC236}">
-                <a16:creationId xmlns:a16="http://schemas.microsoft.com/office/drawing/2014/main" xmlns="" id="{1A8AB3D2-9F44-436F-99FE-2C3461C13B27}"/>
+                <a16:creationId xmlns:a16="http://schemas.microsoft.com/office/drawing/2014/main" id="{1A8AB3D2-9F44-436F-99FE-2C3461C13B27}"/>
               </a:ext>
             </a:extLst>
           </p:cNvPr>
@@ -16114,7 +16024,7 @@
           <p:cNvPr id="12" name="TextBox 11">
             <a:extLst>
               <a:ext uri="{FF2B5EF4-FFF2-40B4-BE49-F238E27FC236}">
-                <a16:creationId xmlns:a16="http://schemas.microsoft.com/office/drawing/2014/main" xmlns="" id="{85681975-EFE4-458D-B57C-8068F52C3D52}"/>
+                <a16:creationId xmlns:a16="http://schemas.microsoft.com/office/drawing/2014/main" id="{85681975-EFE4-458D-B57C-8068F52C3D52}"/>
               </a:ext>
             </a:extLst>
           </p:cNvPr>
@@ -16209,7 +16119,7 @@
     </p:spTree>
     <p:extLst>
       <p:ext uri="{BB962C8B-B14F-4D97-AF65-F5344CB8AC3E}">
-        <p14:creationId xmlns:p14="http://schemas.microsoft.com/office/powerpoint/2010/main" xmlns="" val="3961867376"/>
+        <p14:creationId xmlns:p14="http://schemas.microsoft.com/office/powerpoint/2010/main" val="3961867376"/>
       </p:ext>
     </p:extLst>
   </p:cSld>
@@ -16383,7 +16293,7 @@
           <p:cNvPr id="2" name="Нижний колонтитул 1">
             <a:extLst>
               <a:ext uri="{FF2B5EF4-FFF2-40B4-BE49-F238E27FC236}">
-                <a16:creationId xmlns:a16="http://schemas.microsoft.com/office/drawing/2014/main" xmlns="" id="{B0B944AD-A064-41F9-A961-293AE0778F04}"/>
+                <a16:creationId xmlns:a16="http://schemas.microsoft.com/office/drawing/2014/main" id="{B0B944AD-A064-41F9-A961-293AE0778F04}"/>
               </a:ext>
             </a:extLst>
           </p:cNvPr>
@@ -16413,7 +16323,7 @@
           <p:cNvPr id="4" name="Номер слайда 3">
             <a:extLst>
               <a:ext uri="{FF2B5EF4-FFF2-40B4-BE49-F238E27FC236}">
-                <a16:creationId xmlns:a16="http://schemas.microsoft.com/office/drawing/2014/main" xmlns="" id="{B63A2C4E-C8D3-4FFB-A1CA-A776AEE3F9D4}"/>
+                <a16:creationId xmlns:a16="http://schemas.microsoft.com/office/drawing/2014/main" id="{B63A2C4E-C8D3-4FFB-A1CA-A776AEE3F9D4}"/>
               </a:ext>
             </a:extLst>
           </p:cNvPr>
@@ -16443,7 +16353,7 @@
           <p:cNvPr id="11" name="Google Shape;101;p17">
             <a:extLst>
               <a:ext uri="{FF2B5EF4-FFF2-40B4-BE49-F238E27FC236}">
-                <a16:creationId xmlns:a16="http://schemas.microsoft.com/office/drawing/2014/main" xmlns="" id="{3274333C-B02B-43BD-AD9D-2559753D386A}"/>
+                <a16:creationId xmlns:a16="http://schemas.microsoft.com/office/drawing/2014/main" id="{3274333C-B02B-43BD-AD9D-2559753D386A}"/>
               </a:ext>
             </a:extLst>
           </p:cNvPr>
@@ -16496,7 +16406,7 @@
           <p:cNvPr id="12" name="TextBox 11">
             <a:extLst>
               <a:ext uri="{FF2B5EF4-FFF2-40B4-BE49-F238E27FC236}">
-                <a16:creationId xmlns:a16="http://schemas.microsoft.com/office/drawing/2014/main" xmlns="" id="{85681975-EFE4-458D-B57C-8068F52C3D52}"/>
+                <a16:creationId xmlns:a16="http://schemas.microsoft.com/office/drawing/2014/main" id="{85681975-EFE4-458D-B57C-8068F52C3D52}"/>
               </a:ext>
             </a:extLst>
           </p:cNvPr>
@@ -16700,7 +16610,7 @@
           <p:cNvPr id="5" name="Rectangle 1">
             <a:extLst>
               <a:ext uri="{FF2B5EF4-FFF2-40B4-BE49-F238E27FC236}">
-                <a16:creationId xmlns:a16="http://schemas.microsoft.com/office/drawing/2014/main" xmlns="" id="{0F79F05C-BF2A-45B8-BD7E-D4DDF775EB60}"/>
+                <a16:creationId xmlns:a16="http://schemas.microsoft.com/office/drawing/2014/main" id="{0F79F05C-BF2A-45B8-BD7E-D4DDF775EB60}"/>
               </a:ext>
             </a:extLst>
           </p:cNvPr>
@@ -18118,7 +18028,7 @@
     </p:spTree>
     <p:extLst>
       <p:ext uri="{BB962C8B-B14F-4D97-AF65-F5344CB8AC3E}">
-        <p14:creationId xmlns:p14="http://schemas.microsoft.com/office/powerpoint/2010/main" xmlns="" val="1105158034"/>
+        <p14:creationId xmlns:p14="http://schemas.microsoft.com/office/powerpoint/2010/main" val="1105158034"/>
       </p:ext>
     </p:extLst>
   </p:cSld>
@@ -18292,7 +18202,7 @@
           <p:cNvPr id="2" name="Нижний колонтитул 1">
             <a:extLst>
               <a:ext uri="{FF2B5EF4-FFF2-40B4-BE49-F238E27FC236}">
-                <a16:creationId xmlns:a16="http://schemas.microsoft.com/office/drawing/2014/main" xmlns="" id="{B0B944AD-A064-41F9-A961-293AE0778F04}"/>
+                <a16:creationId xmlns:a16="http://schemas.microsoft.com/office/drawing/2014/main" id="{B0B944AD-A064-41F9-A961-293AE0778F04}"/>
               </a:ext>
             </a:extLst>
           </p:cNvPr>
@@ -18322,7 +18232,7 @@
           <p:cNvPr id="4" name="Номер слайда 3">
             <a:extLst>
               <a:ext uri="{FF2B5EF4-FFF2-40B4-BE49-F238E27FC236}">
-                <a16:creationId xmlns:a16="http://schemas.microsoft.com/office/drawing/2014/main" xmlns="" id="{B63A2C4E-C8D3-4FFB-A1CA-A776AEE3F9D4}"/>
+                <a16:creationId xmlns:a16="http://schemas.microsoft.com/office/drawing/2014/main" id="{B63A2C4E-C8D3-4FFB-A1CA-A776AEE3F9D4}"/>
               </a:ext>
             </a:extLst>
           </p:cNvPr>
@@ -18352,7 +18262,7 @@
           <p:cNvPr id="11" name="Google Shape;101;p17">
             <a:extLst>
               <a:ext uri="{FF2B5EF4-FFF2-40B4-BE49-F238E27FC236}">
-                <a16:creationId xmlns:a16="http://schemas.microsoft.com/office/drawing/2014/main" xmlns="" id="{3274333C-B02B-43BD-AD9D-2559753D386A}"/>
+                <a16:creationId xmlns:a16="http://schemas.microsoft.com/office/drawing/2014/main" id="{3274333C-B02B-43BD-AD9D-2559753D386A}"/>
               </a:ext>
             </a:extLst>
           </p:cNvPr>
@@ -18405,7 +18315,7 @@
           <p:cNvPr id="12" name="TextBox 11">
             <a:extLst>
               <a:ext uri="{FF2B5EF4-FFF2-40B4-BE49-F238E27FC236}">
-                <a16:creationId xmlns:a16="http://schemas.microsoft.com/office/drawing/2014/main" xmlns="" id="{85681975-EFE4-458D-B57C-8068F52C3D52}"/>
+                <a16:creationId xmlns:a16="http://schemas.microsoft.com/office/drawing/2014/main" id="{85681975-EFE4-458D-B57C-8068F52C3D52}"/>
               </a:ext>
             </a:extLst>
           </p:cNvPr>
@@ -18559,7 +18469,7 @@
           <p:cNvPr id="3" name="Rectangle 1">
             <a:extLst>
               <a:ext uri="{FF2B5EF4-FFF2-40B4-BE49-F238E27FC236}">
-                <a16:creationId xmlns:a16="http://schemas.microsoft.com/office/drawing/2014/main" xmlns="" id="{86FBF776-948B-4E28-A542-068FBDF05068}"/>
+                <a16:creationId xmlns:a16="http://schemas.microsoft.com/office/drawing/2014/main" id="{86FBF776-948B-4E28-A542-068FBDF05068}"/>
               </a:ext>
             </a:extLst>
           </p:cNvPr>
@@ -19393,7 +19303,7 @@
           <p:cNvPr id="13" name="Rounded Rectangular Callout 1">
             <a:extLst>
               <a:ext uri="{FF2B5EF4-FFF2-40B4-BE49-F238E27FC236}">
-                <a16:creationId xmlns:a16="http://schemas.microsoft.com/office/drawing/2014/main" xmlns="" id="{397F9FD7-F919-4C90-AA3D-10A5B2D52B08}"/>
+                <a16:creationId xmlns:a16="http://schemas.microsoft.com/office/drawing/2014/main" id="{397F9FD7-F919-4C90-AA3D-10A5B2D52B08}"/>
               </a:ext>
             </a:extLst>
           </p:cNvPr>
@@ -19478,7 +19388,7 @@
           <p:cNvPr id="14" name="TextBox 13">
             <a:extLst>
               <a:ext uri="{FF2B5EF4-FFF2-40B4-BE49-F238E27FC236}">
-                <a16:creationId xmlns:a16="http://schemas.microsoft.com/office/drawing/2014/main" xmlns="" id="{184B3C0E-84E3-4F7C-89F7-5632ED622CA7}"/>
+                <a16:creationId xmlns:a16="http://schemas.microsoft.com/office/drawing/2014/main" id="{184B3C0E-84E3-4F7C-89F7-5632ED622CA7}"/>
               </a:ext>
             </a:extLst>
           </p:cNvPr>
@@ -19616,7 +19526,7 @@
     </p:spTree>
     <p:extLst>
       <p:ext uri="{BB962C8B-B14F-4D97-AF65-F5344CB8AC3E}">
-        <p14:creationId xmlns:p14="http://schemas.microsoft.com/office/powerpoint/2010/main" xmlns="" val="3509446310"/>
+        <p14:creationId xmlns:p14="http://schemas.microsoft.com/office/powerpoint/2010/main" val="3509446310"/>
       </p:ext>
     </p:extLst>
   </p:cSld>
@@ -19868,7 +19778,7 @@
           <p:cNvPr id="2" name="Нижний колонтитул 1">
             <a:extLst>
               <a:ext uri="{FF2B5EF4-FFF2-40B4-BE49-F238E27FC236}">
-                <a16:creationId xmlns:a16="http://schemas.microsoft.com/office/drawing/2014/main" xmlns="" id="{B0B944AD-A064-41F9-A961-293AE0778F04}"/>
+                <a16:creationId xmlns:a16="http://schemas.microsoft.com/office/drawing/2014/main" id="{B0B944AD-A064-41F9-A961-293AE0778F04}"/>
               </a:ext>
             </a:extLst>
           </p:cNvPr>
@@ -19898,7 +19808,7 @@
           <p:cNvPr id="4" name="Номер слайда 3">
             <a:extLst>
               <a:ext uri="{FF2B5EF4-FFF2-40B4-BE49-F238E27FC236}">
-                <a16:creationId xmlns:a16="http://schemas.microsoft.com/office/drawing/2014/main" xmlns="" id="{B63A2C4E-C8D3-4FFB-A1CA-A776AEE3F9D4}"/>
+                <a16:creationId xmlns:a16="http://schemas.microsoft.com/office/drawing/2014/main" id="{B63A2C4E-C8D3-4FFB-A1CA-A776AEE3F9D4}"/>
               </a:ext>
             </a:extLst>
           </p:cNvPr>
@@ -19928,7 +19838,7 @@
           <p:cNvPr id="11" name="Google Shape;101;p17">
             <a:extLst>
               <a:ext uri="{FF2B5EF4-FFF2-40B4-BE49-F238E27FC236}">
-                <a16:creationId xmlns:a16="http://schemas.microsoft.com/office/drawing/2014/main" xmlns="" id="{3274333C-B02B-43BD-AD9D-2559753D386A}"/>
+                <a16:creationId xmlns:a16="http://schemas.microsoft.com/office/drawing/2014/main" id="{3274333C-B02B-43BD-AD9D-2559753D386A}"/>
               </a:ext>
             </a:extLst>
           </p:cNvPr>
@@ -19981,7 +19891,7 @@
           <p:cNvPr id="14" name="TextBox 13">
             <a:extLst>
               <a:ext uri="{FF2B5EF4-FFF2-40B4-BE49-F238E27FC236}">
-                <a16:creationId xmlns:a16="http://schemas.microsoft.com/office/drawing/2014/main" xmlns="" id="{184B3C0E-84E3-4F7C-89F7-5632ED622CA7}"/>
+                <a16:creationId xmlns:a16="http://schemas.microsoft.com/office/drawing/2014/main" id="{184B3C0E-84E3-4F7C-89F7-5632ED622CA7}"/>
               </a:ext>
             </a:extLst>
           </p:cNvPr>
@@ -20107,7 +20017,7 @@
           <p:cNvPr id="5" name="Rectangle 1">
             <a:extLst>
               <a:ext uri="{FF2B5EF4-FFF2-40B4-BE49-F238E27FC236}">
-                <a16:creationId xmlns:a16="http://schemas.microsoft.com/office/drawing/2014/main" xmlns="" id="{A52DA947-D246-4C09-A5CE-CCFF0481A26A}"/>
+                <a16:creationId xmlns:a16="http://schemas.microsoft.com/office/drawing/2014/main" id="{A52DA947-D246-4C09-A5CE-CCFF0481A26A}"/>
               </a:ext>
             </a:extLst>
           </p:cNvPr>
@@ -21020,7 +20930,7 @@
     </p:spTree>
     <p:extLst>
       <p:ext uri="{BB962C8B-B14F-4D97-AF65-F5344CB8AC3E}">
-        <p14:creationId xmlns:p14="http://schemas.microsoft.com/office/powerpoint/2010/main" xmlns="" val="2786324750"/>
+        <p14:creationId xmlns:p14="http://schemas.microsoft.com/office/powerpoint/2010/main" val="2786324750"/>
       </p:ext>
     </p:extLst>
   </p:cSld>
@@ -21193,7 +21103,7 @@
           <p:cNvPr id="2" name="Нижний колонтитул 1">
             <a:extLst>
               <a:ext uri="{FF2B5EF4-FFF2-40B4-BE49-F238E27FC236}">
-                <a16:creationId xmlns:a16="http://schemas.microsoft.com/office/drawing/2014/main" xmlns="" id="{B0B944AD-A064-41F9-A961-293AE0778F04}"/>
+                <a16:creationId xmlns:a16="http://schemas.microsoft.com/office/drawing/2014/main" id="{B0B944AD-A064-41F9-A961-293AE0778F04}"/>
               </a:ext>
             </a:extLst>
           </p:cNvPr>
@@ -21223,7 +21133,7 @@
           <p:cNvPr id="4" name="Номер слайда 3">
             <a:extLst>
               <a:ext uri="{FF2B5EF4-FFF2-40B4-BE49-F238E27FC236}">
-                <a16:creationId xmlns:a16="http://schemas.microsoft.com/office/drawing/2014/main" xmlns="" id="{B63A2C4E-C8D3-4FFB-A1CA-A776AEE3F9D4}"/>
+                <a16:creationId xmlns:a16="http://schemas.microsoft.com/office/drawing/2014/main" id="{B63A2C4E-C8D3-4FFB-A1CA-A776AEE3F9D4}"/>
               </a:ext>
             </a:extLst>
           </p:cNvPr>
@@ -21253,7 +21163,7 @@
           <p:cNvPr id="11" name="Google Shape;101;p17">
             <a:extLst>
               <a:ext uri="{FF2B5EF4-FFF2-40B4-BE49-F238E27FC236}">
-                <a16:creationId xmlns:a16="http://schemas.microsoft.com/office/drawing/2014/main" xmlns="" id="{3274333C-B02B-43BD-AD9D-2559753D386A}"/>
+                <a16:creationId xmlns:a16="http://schemas.microsoft.com/office/drawing/2014/main" id="{3274333C-B02B-43BD-AD9D-2559753D386A}"/>
               </a:ext>
             </a:extLst>
           </p:cNvPr>
@@ -21306,7 +21216,7 @@
           <p:cNvPr id="9" name="Прямоугольник 9">
             <a:extLst>
               <a:ext uri="{FF2B5EF4-FFF2-40B4-BE49-F238E27FC236}">
-                <a16:creationId xmlns:a16="http://schemas.microsoft.com/office/drawing/2014/main" xmlns="" id="{04B3CA77-8474-4D6C-8D77-366E222BA722}"/>
+                <a16:creationId xmlns:a16="http://schemas.microsoft.com/office/drawing/2014/main" id="{04B3CA77-8474-4D6C-8D77-366E222BA722}"/>
               </a:ext>
             </a:extLst>
           </p:cNvPr>
@@ -21358,7 +21268,7 @@
           <p:cNvPr id="10" name="Прямоугольник 10">
             <a:extLst>
               <a:ext uri="{FF2B5EF4-FFF2-40B4-BE49-F238E27FC236}">
-                <a16:creationId xmlns:a16="http://schemas.microsoft.com/office/drawing/2014/main" xmlns="" id="{E8FED6FE-28FC-49E1-9DD4-39C512DD93C1}"/>
+                <a16:creationId xmlns:a16="http://schemas.microsoft.com/office/drawing/2014/main" id="{E8FED6FE-28FC-49E1-9DD4-39C512DD93C1}"/>
               </a:ext>
             </a:extLst>
           </p:cNvPr>
@@ -21416,7 +21326,7 @@
           <p:cNvPr id="14" name="Прямоугольник 9">
             <a:extLst>
               <a:ext uri="{FF2B5EF4-FFF2-40B4-BE49-F238E27FC236}">
-                <a16:creationId xmlns:a16="http://schemas.microsoft.com/office/drawing/2014/main" xmlns="" id="{AA0E4B4E-CB37-4020-B8E7-AA6E592F2834}"/>
+                <a16:creationId xmlns:a16="http://schemas.microsoft.com/office/drawing/2014/main" id="{AA0E4B4E-CB37-4020-B8E7-AA6E592F2834}"/>
               </a:ext>
             </a:extLst>
           </p:cNvPr>
@@ -21468,7 +21378,7 @@
           <p:cNvPr id="15" name="Прямоугольник 10">
             <a:extLst>
               <a:ext uri="{FF2B5EF4-FFF2-40B4-BE49-F238E27FC236}">
-                <a16:creationId xmlns:a16="http://schemas.microsoft.com/office/drawing/2014/main" xmlns="" id="{3CF6DC24-D231-4024-B419-437816713B49}"/>
+                <a16:creationId xmlns:a16="http://schemas.microsoft.com/office/drawing/2014/main" id="{3CF6DC24-D231-4024-B419-437816713B49}"/>
               </a:ext>
             </a:extLst>
           </p:cNvPr>
@@ -21526,7 +21436,7 @@
           <p:cNvPr id="16" name="Прямоугольник 9">
             <a:extLst>
               <a:ext uri="{FF2B5EF4-FFF2-40B4-BE49-F238E27FC236}">
-                <a16:creationId xmlns:a16="http://schemas.microsoft.com/office/drawing/2014/main" xmlns="" id="{F2D879FC-BBAE-44D8-89DB-6AB73F011467}"/>
+                <a16:creationId xmlns:a16="http://schemas.microsoft.com/office/drawing/2014/main" id="{F2D879FC-BBAE-44D8-89DB-6AB73F011467}"/>
               </a:ext>
             </a:extLst>
           </p:cNvPr>
@@ -21578,7 +21488,7 @@
           <p:cNvPr id="17" name="Прямоугольник 10">
             <a:extLst>
               <a:ext uri="{FF2B5EF4-FFF2-40B4-BE49-F238E27FC236}">
-                <a16:creationId xmlns:a16="http://schemas.microsoft.com/office/drawing/2014/main" xmlns="" id="{ACA839A3-43B2-439F-9889-7600B320A32F}"/>
+                <a16:creationId xmlns:a16="http://schemas.microsoft.com/office/drawing/2014/main" id="{ACA839A3-43B2-439F-9889-7600B320A32F}"/>
               </a:ext>
             </a:extLst>
           </p:cNvPr>
@@ -21636,7 +21546,7 @@
           <p:cNvPr id="18" name="TextBox 17">
             <a:extLst>
               <a:ext uri="{FF2B5EF4-FFF2-40B4-BE49-F238E27FC236}">
-                <a16:creationId xmlns:a16="http://schemas.microsoft.com/office/drawing/2014/main" xmlns="" id="{0E7C9E2B-B309-420D-A057-0493F5BC8ABB}"/>
+                <a16:creationId xmlns:a16="http://schemas.microsoft.com/office/drawing/2014/main" id="{0E7C9E2B-B309-420D-A057-0493F5BC8ABB}"/>
               </a:ext>
             </a:extLst>
           </p:cNvPr>
@@ -21678,7 +21588,7 @@
           <p:cNvPr id="19" name="TextBox 18">
             <a:extLst>
               <a:ext uri="{FF2B5EF4-FFF2-40B4-BE49-F238E27FC236}">
-                <a16:creationId xmlns:a16="http://schemas.microsoft.com/office/drawing/2014/main" xmlns="" id="{ED689254-8260-46E3-ADD8-D26AFE4DCF1E}"/>
+                <a16:creationId xmlns:a16="http://schemas.microsoft.com/office/drawing/2014/main" id="{ED689254-8260-46E3-ADD8-D26AFE4DCF1E}"/>
               </a:ext>
             </a:extLst>
           </p:cNvPr>
@@ -21720,7 +21630,7 @@
           <p:cNvPr id="20" name="TextBox 19">
             <a:extLst>
               <a:ext uri="{FF2B5EF4-FFF2-40B4-BE49-F238E27FC236}">
-                <a16:creationId xmlns:a16="http://schemas.microsoft.com/office/drawing/2014/main" xmlns="" id="{591A3142-8512-45BB-A07E-B5C85322184D}"/>
+                <a16:creationId xmlns:a16="http://schemas.microsoft.com/office/drawing/2014/main" id="{591A3142-8512-45BB-A07E-B5C85322184D}"/>
               </a:ext>
             </a:extLst>
           </p:cNvPr>
@@ -21762,7 +21672,7 @@
           <p:cNvPr id="21" name="Rectangle 20">
             <a:extLst>
               <a:ext uri="{FF2B5EF4-FFF2-40B4-BE49-F238E27FC236}">
-                <a16:creationId xmlns:a16="http://schemas.microsoft.com/office/drawing/2014/main" xmlns="" id="{7F1E0805-9D44-44D4-A603-A29D139F14F3}"/>
+                <a16:creationId xmlns:a16="http://schemas.microsoft.com/office/drawing/2014/main" id="{7F1E0805-9D44-44D4-A603-A29D139F14F3}"/>
               </a:ext>
             </a:extLst>
           </p:cNvPr>
@@ -21985,7 +21895,7 @@
     </p:spTree>
     <p:extLst>
       <p:ext uri="{BB962C8B-B14F-4D97-AF65-F5344CB8AC3E}">
-        <p14:creationId xmlns:p14="http://schemas.microsoft.com/office/powerpoint/2010/main" xmlns="" val="1576700746"/>
+        <p14:creationId xmlns:p14="http://schemas.microsoft.com/office/powerpoint/2010/main" val="1576700746"/>
       </p:ext>
     </p:extLst>
   </p:cSld>
@@ -22170,7 +22080,7 @@
           <p:cNvPr id="2" name="Нижний колонтитул 1">
             <a:extLst>
               <a:ext uri="{FF2B5EF4-FFF2-40B4-BE49-F238E27FC236}">
-                <a16:creationId xmlns:a16="http://schemas.microsoft.com/office/drawing/2014/main" xmlns="" id="{B0B944AD-A064-41F9-A961-293AE0778F04}"/>
+                <a16:creationId xmlns:a16="http://schemas.microsoft.com/office/drawing/2014/main" id="{B0B944AD-A064-41F9-A961-293AE0778F04}"/>
               </a:ext>
             </a:extLst>
           </p:cNvPr>
@@ -22200,7 +22110,7 @@
           <p:cNvPr id="4" name="Номер слайда 3">
             <a:extLst>
               <a:ext uri="{FF2B5EF4-FFF2-40B4-BE49-F238E27FC236}">
-                <a16:creationId xmlns:a16="http://schemas.microsoft.com/office/drawing/2014/main" xmlns="" id="{B63A2C4E-C8D3-4FFB-A1CA-A776AEE3F9D4}"/>
+                <a16:creationId xmlns:a16="http://schemas.microsoft.com/office/drawing/2014/main" id="{B63A2C4E-C8D3-4FFB-A1CA-A776AEE3F9D4}"/>
               </a:ext>
             </a:extLst>
           </p:cNvPr>
@@ -22230,7 +22140,7 @@
           <p:cNvPr id="11" name="Google Shape;101;p17">
             <a:extLst>
               <a:ext uri="{FF2B5EF4-FFF2-40B4-BE49-F238E27FC236}">
-                <a16:creationId xmlns:a16="http://schemas.microsoft.com/office/drawing/2014/main" xmlns="" id="{3274333C-B02B-43BD-AD9D-2559753D386A}"/>
+                <a16:creationId xmlns:a16="http://schemas.microsoft.com/office/drawing/2014/main" id="{3274333C-B02B-43BD-AD9D-2559753D386A}"/>
               </a:ext>
             </a:extLst>
           </p:cNvPr>
@@ -22283,7 +22193,7 @@
           <p:cNvPr id="22" name="TextBox 21">
             <a:extLst>
               <a:ext uri="{FF2B5EF4-FFF2-40B4-BE49-F238E27FC236}">
-                <a16:creationId xmlns:a16="http://schemas.microsoft.com/office/drawing/2014/main" xmlns="" id="{9C181E46-B841-4FF5-87A4-2017F5DF5CB7}"/>
+                <a16:creationId xmlns:a16="http://schemas.microsoft.com/office/drawing/2014/main" id="{9C181E46-B841-4FF5-87A4-2017F5DF5CB7}"/>
               </a:ext>
             </a:extLst>
           </p:cNvPr>
@@ -22676,7 +22586,7 @@
     </p:spTree>
     <p:extLst>
       <p:ext uri="{BB962C8B-B14F-4D97-AF65-F5344CB8AC3E}">
-        <p14:creationId xmlns:p14="http://schemas.microsoft.com/office/powerpoint/2010/main" xmlns="" val="2894872876"/>
+        <p14:creationId xmlns:p14="http://schemas.microsoft.com/office/powerpoint/2010/main" val="2894872876"/>
       </p:ext>
     </p:extLst>
   </p:cSld>
@@ -22850,7 +22760,7 @@
           <p:cNvPr id="2" name="Нижний колонтитул 1">
             <a:extLst>
               <a:ext uri="{FF2B5EF4-FFF2-40B4-BE49-F238E27FC236}">
-                <a16:creationId xmlns:a16="http://schemas.microsoft.com/office/drawing/2014/main" xmlns="" id="{B0B944AD-A064-41F9-A961-293AE0778F04}"/>
+                <a16:creationId xmlns:a16="http://schemas.microsoft.com/office/drawing/2014/main" id="{B0B944AD-A064-41F9-A961-293AE0778F04}"/>
               </a:ext>
             </a:extLst>
           </p:cNvPr>
@@ -22880,7 +22790,7 @@
           <p:cNvPr id="4" name="Номер слайда 3">
             <a:extLst>
               <a:ext uri="{FF2B5EF4-FFF2-40B4-BE49-F238E27FC236}">
-                <a16:creationId xmlns:a16="http://schemas.microsoft.com/office/drawing/2014/main" xmlns="" id="{B63A2C4E-C8D3-4FFB-A1CA-A776AEE3F9D4}"/>
+                <a16:creationId xmlns:a16="http://schemas.microsoft.com/office/drawing/2014/main" id="{B63A2C4E-C8D3-4FFB-A1CA-A776AEE3F9D4}"/>
               </a:ext>
             </a:extLst>
           </p:cNvPr>
@@ -22910,7 +22820,7 @@
           <p:cNvPr id="11" name="Google Shape;101;p17">
             <a:extLst>
               <a:ext uri="{FF2B5EF4-FFF2-40B4-BE49-F238E27FC236}">
-                <a16:creationId xmlns:a16="http://schemas.microsoft.com/office/drawing/2014/main" xmlns="" id="{3274333C-B02B-43BD-AD9D-2559753D386A}"/>
+                <a16:creationId xmlns:a16="http://schemas.microsoft.com/office/drawing/2014/main" id="{3274333C-B02B-43BD-AD9D-2559753D386A}"/>
               </a:ext>
             </a:extLst>
           </p:cNvPr>
@@ -22963,7 +22873,7 @@
           <p:cNvPr id="23" name="Прямоугольник 8">
             <a:extLst>
               <a:ext uri="{FF2B5EF4-FFF2-40B4-BE49-F238E27FC236}">
-                <a16:creationId xmlns:a16="http://schemas.microsoft.com/office/drawing/2014/main" xmlns="" id="{9730D4CD-E31F-4FF9-90B4-457C3EF0B201}"/>
+                <a16:creationId xmlns:a16="http://schemas.microsoft.com/office/drawing/2014/main" id="{9730D4CD-E31F-4FF9-90B4-457C3EF0B201}"/>
               </a:ext>
             </a:extLst>
           </p:cNvPr>
@@ -23351,7 +23261,7 @@
     </p:spTree>
     <p:extLst>
       <p:ext uri="{BB962C8B-B14F-4D97-AF65-F5344CB8AC3E}">
-        <p14:creationId xmlns:p14="http://schemas.microsoft.com/office/powerpoint/2010/main" xmlns="" val="840741982"/>
+        <p14:creationId xmlns:p14="http://schemas.microsoft.com/office/powerpoint/2010/main" val="840741982"/>
       </p:ext>
     </p:extLst>
   </p:cSld>
@@ -23525,7 +23435,7 @@
           <p:cNvPr id="2" name="Нижний колонтитул 1">
             <a:extLst>
               <a:ext uri="{FF2B5EF4-FFF2-40B4-BE49-F238E27FC236}">
-                <a16:creationId xmlns:a16="http://schemas.microsoft.com/office/drawing/2014/main" xmlns="" id="{B0B944AD-A064-41F9-A961-293AE0778F04}"/>
+                <a16:creationId xmlns:a16="http://schemas.microsoft.com/office/drawing/2014/main" id="{B0B944AD-A064-41F9-A961-293AE0778F04}"/>
               </a:ext>
             </a:extLst>
           </p:cNvPr>
@@ -23555,7 +23465,7 @@
           <p:cNvPr id="4" name="Номер слайда 3">
             <a:extLst>
               <a:ext uri="{FF2B5EF4-FFF2-40B4-BE49-F238E27FC236}">
-                <a16:creationId xmlns:a16="http://schemas.microsoft.com/office/drawing/2014/main" xmlns="" id="{B63A2C4E-C8D3-4FFB-A1CA-A776AEE3F9D4}"/>
+                <a16:creationId xmlns:a16="http://schemas.microsoft.com/office/drawing/2014/main" id="{B63A2C4E-C8D3-4FFB-A1CA-A776AEE3F9D4}"/>
               </a:ext>
             </a:extLst>
           </p:cNvPr>
@@ -23585,7 +23495,7 @@
           <p:cNvPr id="11" name="Google Shape;101;p17">
             <a:extLst>
               <a:ext uri="{FF2B5EF4-FFF2-40B4-BE49-F238E27FC236}">
-                <a16:creationId xmlns:a16="http://schemas.microsoft.com/office/drawing/2014/main" xmlns="" id="{3274333C-B02B-43BD-AD9D-2559753D386A}"/>
+                <a16:creationId xmlns:a16="http://schemas.microsoft.com/office/drawing/2014/main" id="{3274333C-B02B-43BD-AD9D-2559753D386A}"/>
               </a:ext>
             </a:extLst>
           </p:cNvPr>
@@ -23638,7 +23548,7 @@
           <p:cNvPr id="3" name="Rectangle 1">
             <a:extLst>
               <a:ext uri="{FF2B5EF4-FFF2-40B4-BE49-F238E27FC236}">
-                <a16:creationId xmlns:a16="http://schemas.microsoft.com/office/drawing/2014/main" xmlns="" id="{613B8091-D427-4F2A-AA88-5EFADE201A24}"/>
+                <a16:creationId xmlns:a16="http://schemas.microsoft.com/office/drawing/2014/main" id="{613B8091-D427-4F2A-AA88-5EFADE201A24}"/>
               </a:ext>
             </a:extLst>
           </p:cNvPr>
@@ -24978,7 +24888,7 @@
           <p:cNvPr id="5" name="Rectangle 1">
             <a:extLst>
               <a:ext uri="{FF2B5EF4-FFF2-40B4-BE49-F238E27FC236}">
-                <a16:creationId xmlns:a16="http://schemas.microsoft.com/office/drawing/2014/main" xmlns="" id="{3A2C1F08-DFB7-4BDB-97AF-3D12EF73DF12}"/>
+                <a16:creationId xmlns:a16="http://schemas.microsoft.com/office/drawing/2014/main" id="{3A2C1F08-DFB7-4BDB-97AF-3D12EF73DF12}"/>
               </a:ext>
             </a:extLst>
           </p:cNvPr>
@@ -25778,7 +25688,7 @@
           <p:cNvPr id="12" name="Picture 2" descr="Image result for java 7">
             <a:extLst>
               <a:ext uri="{FF2B5EF4-FFF2-40B4-BE49-F238E27FC236}">
-                <a16:creationId xmlns:a16="http://schemas.microsoft.com/office/drawing/2014/main" xmlns="" id="{9DFF828D-49B5-468C-B31E-FF7ABC448A83}"/>
+                <a16:creationId xmlns:a16="http://schemas.microsoft.com/office/drawing/2014/main" id="{9DFF828D-49B5-468C-B31E-FF7ABC448A83}"/>
               </a:ext>
             </a:extLst>
           </p:cNvPr>
@@ -25791,7 +25701,7 @@
           <a:blip r:embed="rId4">
             <a:extLst>
               <a:ext uri="{28A0092B-C50C-407E-A947-70E740481C1C}">
-                <a14:useLocalDpi xmlns:a14="http://schemas.microsoft.com/office/drawing/2010/main" xmlns="" val="0"/>
+                <a14:useLocalDpi xmlns:a14="http://schemas.microsoft.com/office/drawing/2010/main" val="0"/>
               </a:ext>
             </a:extLst>
           </a:blip>
@@ -25814,14 +25724,14 @@
           </a:ln>
           <a:extLst>
             <a:ext uri="{909E8E84-426E-40DD-AFC4-6F175D3DCCD1}">
-              <a14:hiddenFill xmlns:a14="http://schemas.microsoft.com/office/drawing/2010/main" xmlns="">
+              <a14:hiddenFill xmlns:a14="http://schemas.microsoft.com/office/drawing/2010/main">
                 <a:solidFill>
                   <a:srgbClr val="FFFFFF"/>
                 </a:solidFill>
               </a14:hiddenFill>
             </a:ext>
             <a:ext uri="{91240B29-F687-4F45-9708-019B960494DF}">
-              <a14:hiddenLine xmlns:a14="http://schemas.microsoft.com/office/drawing/2010/main" xmlns="" w="9525">
+              <a14:hiddenLine xmlns:a14="http://schemas.microsoft.com/office/drawing/2010/main" w="9525">
                 <a:solidFill>
                   <a:srgbClr val="000000"/>
                 </a:solidFill>
@@ -25836,7 +25746,7 @@
     </p:spTree>
     <p:extLst>
       <p:ext uri="{BB962C8B-B14F-4D97-AF65-F5344CB8AC3E}">
-        <p14:creationId xmlns:p14="http://schemas.microsoft.com/office/powerpoint/2010/main" xmlns="" val="3277383880"/>
+        <p14:creationId xmlns:p14="http://schemas.microsoft.com/office/powerpoint/2010/main" val="3277383880"/>
       </p:ext>
     </p:extLst>
   </p:cSld>
@@ -26010,7 +25920,7 @@
           <p:cNvPr id="2" name="Нижний колонтитул 1">
             <a:extLst>
               <a:ext uri="{FF2B5EF4-FFF2-40B4-BE49-F238E27FC236}">
-                <a16:creationId xmlns:a16="http://schemas.microsoft.com/office/drawing/2014/main" xmlns="" id="{B0B944AD-A064-41F9-A961-293AE0778F04}"/>
+                <a16:creationId xmlns:a16="http://schemas.microsoft.com/office/drawing/2014/main" id="{B0B944AD-A064-41F9-A961-293AE0778F04}"/>
               </a:ext>
             </a:extLst>
           </p:cNvPr>
@@ -26040,7 +25950,7 @@
           <p:cNvPr id="4" name="Номер слайда 3">
             <a:extLst>
               <a:ext uri="{FF2B5EF4-FFF2-40B4-BE49-F238E27FC236}">
-                <a16:creationId xmlns:a16="http://schemas.microsoft.com/office/drawing/2014/main" xmlns="" id="{B63A2C4E-C8D3-4FFB-A1CA-A776AEE3F9D4}"/>
+                <a16:creationId xmlns:a16="http://schemas.microsoft.com/office/drawing/2014/main" id="{B63A2C4E-C8D3-4FFB-A1CA-A776AEE3F9D4}"/>
               </a:ext>
             </a:extLst>
           </p:cNvPr>
@@ -26070,7 +25980,7 @@
           <p:cNvPr id="11" name="Google Shape;101;p17">
             <a:extLst>
               <a:ext uri="{FF2B5EF4-FFF2-40B4-BE49-F238E27FC236}">
-                <a16:creationId xmlns:a16="http://schemas.microsoft.com/office/drawing/2014/main" xmlns="" id="{3274333C-B02B-43BD-AD9D-2559753D386A}"/>
+                <a16:creationId xmlns:a16="http://schemas.microsoft.com/office/drawing/2014/main" id="{3274333C-B02B-43BD-AD9D-2559753D386A}"/>
               </a:ext>
             </a:extLst>
           </p:cNvPr>
@@ -26123,7 +26033,7 @@
           <p:cNvPr id="13" name="TextBox 12">
             <a:extLst>
               <a:ext uri="{FF2B5EF4-FFF2-40B4-BE49-F238E27FC236}">
-                <a16:creationId xmlns:a16="http://schemas.microsoft.com/office/drawing/2014/main" xmlns="" id="{3BDE0AEA-24B5-4D41-B340-A35812652DB3}"/>
+                <a16:creationId xmlns:a16="http://schemas.microsoft.com/office/drawing/2014/main" id="{3BDE0AEA-24B5-4D41-B340-A35812652DB3}"/>
               </a:ext>
             </a:extLst>
           </p:cNvPr>
@@ -26936,7 +26846,7 @@
     </p:spTree>
     <p:extLst>
       <p:ext uri="{BB962C8B-B14F-4D97-AF65-F5344CB8AC3E}">
-        <p14:creationId xmlns:p14="http://schemas.microsoft.com/office/powerpoint/2010/main" xmlns="" val="2583181809"/>
+        <p14:creationId xmlns:p14="http://schemas.microsoft.com/office/powerpoint/2010/main" val="2583181809"/>
       </p:ext>
     </p:extLst>
   </p:cSld>
@@ -27102,7 +27012,7 @@
           <p:cNvPr id="2" name="Нижний колонтитул 1">
             <a:extLst>
               <a:ext uri="{FF2B5EF4-FFF2-40B4-BE49-F238E27FC236}">
-                <a16:creationId xmlns:a16="http://schemas.microsoft.com/office/drawing/2014/main" xmlns="" id="{B0B944AD-A064-41F9-A961-293AE0778F04}"/>
+                <a16:creationId xmlns:a16="http://schemas.microsoft.com/office/drawing/2014/main" id="{B0B944AD-A064-41F9-A961-293AE0778F04}"/>
               </a:ext>
             </a:extLst>
           </p:cNvPr>
@@ -27132,7 +27042,7 @@
           <p:cNvPr id="4" name="Номер слайда 3">
             <a:extLst>
               <a:ext uri="{FF2B5EF4-FFF2-40B4-BE49-F238E27FC236}">
-                <a16:creationId xmlns:a16="http://schemas.microsoft.com/office/drawing/2014/main" xmlns="" id="{B63A2C4E-C8D3-4FFB-A1CA-A776AEE3F9D4}"/>
+                <a16:creationId xmlns:a16="http://schemas.microsoft.com/office/drawing/2014/main" id="{B63A2C4E-C8D3-4FFB-A1CA-A776AEE3F9D4}"/>
               </a:ext>
             </a:extLst>
           </p:cNvPr>
@@ -27162,7 +27072,7 @@
           <p:cNvPr id="11" name="Google Shape;101;p17">
             <a:extLst>
               <a:ext uri="{FF2B5EF4-FFF2-40B4-BE49-F238E27FC236}">
-                <a16:creationId xmlns:a16="http://schemas.microsoft.com/office/drawing/2014/main" xmlns="" id="{3274333C-B02B-43BD-AD9D-2559753D386A}"/>
+                <a16:creationId xmlns:a16="http://schemas.microsoft.com/office/drawing/2014/main" id="{3274333C-B02B-43BD-AD9D-2559753D386A}"/>
               </a:ext>
             </a:extLst>
           </p:cNvPr>
@@ -27215,7 +27125,7 @@
           <p:cNvPr id="9" name="Picture 5" descr="The call stack showing three method calls, where the first method called has the exception handler.">
             <a:extLst>
               <a:ext uri="{FF2B5EF4-FFF2-40B4-BE49-F238E27FC236}">
-                <a16:creationId xmlns:a16="http://schemas.microsoft.com/office/drawing/2014/main" xmlns="" id="{2063A6B7-C5E8-41B0-A2FB-0C6F2434C509}"/>
+                <a16:creationId xmlns:a16="http://schemas.microsoft.com/office/drawing/2014/main" id="{2063A6B7-C5E8-41B0-A2FB-0C6F2434C509}"/>
               </a:ext>
             </a:extLst>
           </p:cNvPr>
@@ -27228,7 +27138,7 @@
           <a:blip r:embed="rId4">
             <a:extLst>
               <a:ext uri="{28A0092B-C50C-407E-A947-70E740481C1C}">
-                <a14:useLocalDpi xmlns:a14="http://schemas.microsoft.com/office/drawing/2010/main" xmlns="" val="0"/>
+                <a14:useLocalDpi xmlns:a14="http://schemas.microsoft.com/office/drawing/2010/main" val="0"/>
               </a:ext>
             </a:extLst>
           </a:blip>
@@ -27251,14 +27161,14 @@
           </a:ln>
           <a:extLst>
             <a:ext uri="{909E8E84-426E-40DD-AFC4-6F175D3DCCD1}">
-              <a14:hiddenFill xmlns:a14="http://schemas.microsoft.com/office/drawing/2010/main" xmlns="">
+              <a14:hiddenFill xmlns:a14="http://schemas.microsoft.com/office/drawing/2010/main">
                 <a:solidFill>
                   <a:srgbClr val="FFFFFF"/>
                 </a:solidFill>
               </a14:hiddenFill>
             </a:ext>
             <a:ext uri="{91240B29-F687-4F45-9708-019B960494DF}">
-              <a14:hiddenLine xmlns:a14="http://schemas.microsoft.com/office/drawing/2010/main" xmlns="" w="9525">
+              <a14:hiddenLine xmlns:a14="http://schemas.microsoft.com/office/drawing/2010/main" w="9525">
                 <a:solidFill>
                   <a:srgbClr val="000000"/>
                 </a:solidFill>
@@ -27275,7 +27185,7 @@
           <p:cNvPr id="12" name="TextBox 11">
             <a:extLst>
               <a:ext uri="{FF2B5EF4-FFF2-40B4-BE49-F238E27FC236}">
-                <a16:creationId xmlns:a16="http://schemas.microsoft.com/office/drawing/2014/main" xmlns="" id="{53CF427C-606E-49A9-8901-59F0E76544A1}"/>
+                <a16:creationId xmlns:a16="http://schemas.microsoft.com/office/drawing/2014/main" id="{53CF427C-606E-49A9-8901-59F0E76544A1}"/>
               </a:ext>
             </a:extLst>
           </p:cNvPr>
@@ -27388,7 +27298,7 @@
     </p:spTree>
     <p:extLst>
       <p:ext uri="{BB962C8B-B14F-4D97-AF65-F5344CB8AC3E}">
-        <p14:creationId xmlns:p14="http://schemas.microsoft.com/office/powerpoint/2010/main" xmlns="" val="3542584932"/>
+        <p14:creationId xmlns:p14="http://schemas.microsoft.com/office/powerpoint/2010/main" val="3542584932"/>
       </p:ext>
     </p:extLst>
   </p:cSld>
@@ -27554,7 +27464,7 @@
           <p:cNvPr id="2" name="Нижний колонтитул 1">
             <a:extLst>
               <a:ext uri="{FF2B5EF4-FFF2-40B4-BE49-F238E27FC236}">
-                <a16:creationId xmlns:a16="http://schemas.microsoft.com/office/drawing/2014/main" xmlns="" id="{B0B944AD-A064-41F9-A961-293AE0778F04}"/>
+                <a16:creationId xmlns:a16="http://schemas.microsoft.com/office/drawing/2014/main" id="{B0B944AD-A064-41F9-A961-293AE0778F04}"/>
               </a:ext>
             </a:extLst>
           </p:cNvPr>
@@ -27584,7 +27494,7 @@
           <p:cNvPr id="4" name="Номер слайда 3">
             <a:extLst>
               <a:ext uri="{FF2B5EF4-FFF2-40B4-BE49-F238E27FC236}">
-                <a16:creationId xmlns:a16="http://schemas.microsoft.com/office/drawing/2014/main" xmlns="" id="{B63A2C4E-C8D3-4FFB-A1CA-A776AEE3F9D4}"/>
+                <a16:creationId xmlns:a16="http://schemas.microsoft.com/office/drawing/2014/main" id="{B63A2C4E-C8D3-4FFB-A1CA-A776AEE3F9D4}"/>
               </a:ext>
             </a:extLst>
           </p:cNvPr>
@@ -27614,7 +27524,7 @@
           <p:cNvPr id="11" name="Google Shape;101;p17">
             <a:extLst>
               <a:ext uri="{FF2B5EF4-FFF2-40B4-BE49-F238E27FC236}">
-                <a16:creationId xmlns:a16="http://schemas.microsoft.com/office/drawing/2014/main" xmlns="" id="{3274333C-B02B-43BD-AD9D-2559753D386A}"/>
+                <a16:creationId xmlns:a16="http://schemas.microsoft.com/office/drawing/2014/main" id="{3274333C-B02B-43BD-AD9D-2559753D386A}"/>
               </a:ext>
             </a:extLst>
           </p:cNvPr>
@@ -27667,7 +27577,7 @@
           <p:cNvPr id="9" name="Picture 3">
             <a:extLst>
               <a:ext uri="{FF2B5EF4-FFF2-40B4-BE49-F238E27FC236}">
-                <a16:creationId xmlns:a16="http://schemas.microsoft.com/office/drawing/2014/main" xmlns="" id="{1206EE12-0B37-4150-9D98-61740D168075}"/>
+                <a16:creationId xmlns:a16="http://schemas.microsoft.com/office/drawing/2014/main" id="{1206EE12-0B37-4150-9D98-61740D168075}"/>
               </a:ext>
             </a:extLst>
           </p:cNvPr>
@@ -27680,7 +27590,7 @@
           <a:blip r:embed="rId4">
             <a:extLst>
               <a:ext uri="{28A0092B-C50C-407E-A947-70E740481C1C}">
-                <a14:useLocalDpi xmlns:a14="http://schemas.microsoft.com/office/drawing/2010/main" xmlns="" val="0"/>
+                <a14:useLocalDpi xmlns:a14="http://schemas.microsoft.com/office/drawing/2010/main" val="0"/>
               </a:ext>
             </a:extLst>
           </a:blip>
@@ -27703,14 +27613,14 @@
           </a:ln>
           <a:extLst>
             <a:ext uri="{909E8E84-426E-40DD-AFC4-6F175D3DCCD1}">
-              <a14:hiddenFill xmlns:a14="http://schemas.microsoft.com/office/drawing/2010/main" xmlns="">
+              <a14:hiddenFill xmlns:a14="http://schemas.microsoft.com/office/drawing/2010/main">
                 <a:solidFill>
                   <a:schemeClr val="accent1"/>
                 </a:solidFill>
               </a14:hiddenFill>
             </a:ext>
             <a:ext uri="{91240B29-F687-4F45-9708-019B960494DF}">
-              <a14:hiddenLine xmlns:a14="http://schemas.microsoft.com/office/drawing/2010/main" xmlns="" w="9525" algn="ctr">
+              <a14:hiddenLine xmlns:a14="http://schemas.microsoft.com/office/drawing/2010/main" w="9525" algn="ctr">
                 <a:solidFill>
                   <a:schemeClr val="tx1"/>
                 </a:solidFill>
@@ -27727,7 +27637,7 @@
           <p:cNvPr id="10" name="Oval 2">
             <a:extLst>
               <a:ext uri="{FF2B5EF4-FFF2-40B4-BE49-F238E27FC236}">
-                <a16:creationId xmlns:a16="http://schemas.microsoft.com/office/drawing/2014/main" xmlns="" id="{101FAE3E-8D21-418B-AE68-9BE353C0C003}"/>
+                <a16:creationId xmlns:a16="http://schemas.microsoft.com/office/drawing/2014/main" id="{101FAE3E-8D21-418B-AE68-9BE353C0C003}"/>
               </a:ext>
             </a:extLst>
           </p:cNvPr>
@@ -27756,14 +27666,14 @@
           <a:effectLst/>
           <a:extLst>
             <a:ext uri="{909E8E84-426E-40DD-AFC4-6F175D3DCCD1}">
-              <a14:hiddenFill xmlns:a14="http://schemas.microsoft.com/office/drawing/2010/main" xmlns="">
+              <a14:hiddenFill xmlns:a14="http://schemas.microsoft.com/office/drawing/2010/main">
                 <a:solidFill>
                   <a:schemeClr val="accent1"/>
                 </a:solidFill>
               </a14:hiddenFill>
             </a:ext>
             <a:ext uri="{AF507438-7753-43E0-B8FC-AC1667EBCBE1}">
-              <a14:hiddenEffects xmlns:a14="http://schemas.microsoft.com/office/drawing/2010/main" xmlns="">
+              <a14:hiddenEffects xmlns:a14="http://schemas.microsoft.com/office/drawing/2010/main">
                 <a:effectLst>
                   <a:outerShdw dist="35921" dir="2700000" algn="ctr" rotWithShape="0">
                     <a:schemeClr val="bg2"/>
@@ -27913,7 +27823,7 @@
     </p:spTree>
     <p:extLst>
       <p:ext uri="{BB962C8B-B14F-4D97-AF65-F5344CB8AC3E}">
-        <p14:creationId xmlns:p14="http://schemas.microsoft.com/office/powerpoint/2010/main" xmlns="" val="2294196756"/>
+        <p14:creationId xmlns:p14="http://schemas.microsoft.com/office/powerpoint/2010/main" val="2294196756"/>
       </p:ext>
     </p:extLst>
   </p:cSld>
@@ -28079,7 +27989,7 @@
           <p:cNvPr id="2" name="Нижний колонтитул 1">
             <a:extLst>
               <a:ext uri="{FF2B5EF4-FFF2-40B4-BE49-F238E27FC236}">
-                <a16:creationId xmlns:a16="http://schemas.microsoft.com/office/drawing/2014/main" xmlns="" id="{B0B944AD-A064-41F9-A961-293AE0778F04}"/>
+                <a16:creationId xmlns:a16="http://schemas.microsoft.com/office/drawing/2014/main" id="{B0B944AD-A064-41F9-A961-293AE0778F04}"/>
               </a:ext>
             </a:extLst>
           </p:cNvPr>
@@ -28109,7 +28019,7 @@
           <p:cNvPr id="4" name="Номер слайда 3">
             <a:extLst>
               <a:ext uri="{FF2B5EF4-FFF2-40B4-BE49-F238E27FC236}">
-                <a16:creationId xmlns:a16="http://schemas.microsoft.com/office/drawing/2014/main" xmlns="" id="{B63A2C4E-C8D3-4FFB-A1CA-A776AEE3F9D4}"/>
+                <a16:creationId xmlns:a16="http://schemas.microsoft.com/office/drawing/2014/main" id="{B63A2C4E-C8D3-4FFB-A1CA-A776AEE3F9D4}"/>
               </a:ext>
             </a:extLst>
           </p:cNvPr>
@@ -28139,7 +28049,7 @@
           <p:cNvPr id="11" name="Google Shape;101;p17">
             <a:extLst>
               <a:ext uri="{FF2B5EF4-FFF2-40B4-BE49-F238E27FC236}">
-                <a16:creationId xmlns:a16="http://schemas.microsoft.com/office/drawing/2014/main" xmlns="" id="{3274333C-B02B-43BD-AD9D-2559753D386A}"/>
+                <a16:creationId xmlns:a16="http://schemas.microsoft.com/office/drawing/2014/main" id="{3274333C-B02B-43BD-AD9D-2559753D386A}"/>
               </a:ext>
             </a:extLst>
           </p:cNvPr>
@@ -28192,7 +28102,7 @@
           <p:cNvPr id="12" name="Picture 5">
             <a:extLst>
               <a:ext uri="{FF2B5EF4-FFF2-40B4-BE49-F238E27FC236}">
-                <a16:creationId xmlns:a16="http://schemas.microsoft.com/office/drawing/2014/main" xmlns="" id="{542A7391-E89B-45A7-93C0-91B0F5208C46}"/>
+                <a16:creationId xmlns:a16="http://schemas.microsoft.com/office/drawing/2014/main" id="{542A7391-E89B-45A7-93C0-91B0F5208C46}"/>
               </a:ext>
             </a:extLst>
           </p:cNvPr>
@@ -28205,7 +28115,7 @@
           <a:blip r:embed="rId4">
             <a:extLst>
               <a:ext uri="{28A0092B-C50C-407E-A947-70E740481C1C}">
-                <a14:useLocalDpi xmlns:a14="http://schemas.microsoft.com/office/drawing/2010/main" xmlns="" val="0"/>
+                <a14:useLocalDpi xmlns:a14="http://schemas.microsoft.com/office/drawing/2010/main" val="0"/>
               </a:ext>
             </a:extLst>
           </a:blip>
@@ -28228,14 +28138,14 @@
           </a:ln>
           <a:extLst>
             <a:ext uri="{909E8E84-426E-40DD-AFC4-6F175D3DCCD1}">
-              <a14:hiddenFill xmlns:a14="http://schemas.microsoft.com/office/drawing/2010/main" xmlns="">
+              <a14:hiddenFill xmlns:a14="http://schemas.microsoft.com/office/drawing/2010/main">
                 <a:solidFill>
                   <a:srgbClr val="FFFFFF"/>
                 </a:solidFill>
               </a14:hiddenFill>
             </a:ext>
             <a:ext uri="{91240B29-F687-4F45-9708-019B960494DF}">
-              <a14:hiddenLine xmlns:a14="http://schemas.microsoft.com/office/drawing/2010/main" xmlns="" w="9525">
+              <a14:hiddenLine xmlns:a14="http://schemas.microsoft.com/office/drawing/2010/main" w="9525">
                 <a:solidFill>
                   <a:srgbClr val="000000"/>
                 </a:solidFill>
@@ -28252,7 +28162,7 @@
           <p:cNvPr id="13" name="TextBox 12">
             <a:extLst>
               <a:ext uri="{FF2B5EF4-FFF2-40B4-BE49-F238E27FC236}">
-                <a16:creationId xmlns:a16="http://schemas.microsoft.com/office/drawing/2014/main" xmlns="" id="{3C8CF1BB-AC45-4C08-B671-211A23D43C4D}"/>
+                <a16:creationId xmlns:a16="http://schemas.microsoft.com/office/drawing/2014/main" id="{3C8CF1BB-AC45-4C08-B671-211A23D43C4D}"/>
               </a:ext>
             </a:extLst>
           </p:cNvPr>
@@ -28414,7 +28324,7 @@
           <p:cNvPr id="14" name="TextBox 13">
             <a:extLst>
               <a:ext uri="{FF2B5EF4-FFF2-40B4-BE49-F238E27FC236}">
-                <a16:creationId xmlns:a16="http://schemas.microsoft.com/office/drawing/2014/main" xmlns="" id="{BFD616EC-8B2D-43B8-AAE6-C60A5044BA5D}"/>
+                <a16:creationId xmlns:a16="http://schemas.microsoft.com/office/drawing/2014/main" id="{BFD616EC-8B2D-43B8-AAE6-C60A5044BA5D}"/>
               </a:ext>
             </a:extLst>
           </p:cNvPr>
@@ -28459,7 +28369,7 @@
           <p:cNvPr id="15" name="TextBox 14">
             <a:extLst>
               <a:ext uri="{FF2B5EF4-FFF2-40B4-BE49-F238E27FC236}">
-                <a16:creationId xmlns:a16="http://schemas.microsoft.com/office/drawing/2014/main" xmlns="" id="{37883963-FF1D-425B-A3F6-270DD3E0B134}"/>
+                <a16:creationId xmlns:a16="http://schemas.microsoft.com/office/drawing/2014/main" id="{37883963-FF1D-425B-A3F6-270DD3E0B134}"/>
               </a:ext>
             </a:extLst>
           </p:cNvPr>
@@ -28504,7 +28414,7 @@
           <p:cNvPr id="16" name="Прямая со стрелкой 14">
             <a:extLst>
               <a:ext uri="{FF2B5EF4-FFF2-40B4-BE49-F238E27FC236}">
-                <a16:creationId xmlns:a16="http://schemas.microsoft.com/office/drawing/2014/main" xmlns="" id="{30A0C8F8-A665-492A-98A9-03C283A6AABA}"/>
+                <a16:creationId xmlns:a16="http://schemas.microsoft.com/office/drawing/2014/main" id="{30A0C8F8-A665-492A-98A9-03C283A6AABA}"/>
               </a:ext>
             </a:extLst>
           </p:cNvPr>
@@ -28548,7 +28458,7 @@
           <p:cNvPr id="17" name="Прямая со стрелкой 14">
             <a:extLst>
               <a:ext uri="{FF2B5EF4-FFF2-40B4-BE49-F238E27FC236}">
-                <a16:creationId xmlns:a16="http://schemas.microsoft.com/office/drawing/2014/main" xmlns="" id="{952AD8E3-22FA-4E56-AE62-6461B5099B17}"/>
+                <a16:creationId xmlns:a16="http://schemas.microsoft.com/office/drawing/2014/main" id="{952AD8E3-22FA-4E56-AE62-6461B5099B17}"/>
               </a:ext>
             </a:extLst>
           </p:cNvPr>
@@ -28592,7 +28502,7 @@
           <p:cNvPr id="18" name="Прямая со стрелкой 14">
             <a:extLst>
               <a:ext uri="{FF2B5EF4-FFF2-40B4-BE49-F238E27FC236}">
-                <a16:creationId xmlns:a16="http://schemas.microsoft.com/office/drawing/2014/main" xmlns="" id="{61EE088C-F2DE-4EBD-9C81-27C890DD3B1D}"/>
+                <a16:creationId xmlns:a16="http://schemas.microsoft.com/office/drawing/2014/main" id="{61EE088C-F2DE-4EBD-9C81-27C890DD3B1D}"/>
               </a:ext>
             </a:extLst>
           </p:cNvPr>
@@ -28634,7 +28544,7 @@
     </p:spTree>
     <p:extLst>
       <p:ext uri="{BB962C8B-B14F-4D97-AF65-F5344CB8AC3E}">
-        <p14:creationId xmlns:p14="http://schemas.microsoft.com/office/powerpoint/2010/main" xmlns="" val="2860724817"/>
+        <p14:creationId xmlns:p14="http://schemas.microsoft.com/office/powerpoint/2010/main" val="2860724817"/>
       </p:ext>
     </p:extLst>
   </p:cSld>

</xml_diff>